<commit_message>
Add notes to pptx
</commit_message>
<xml_diff>
--- a/Az durable functions.pptx
+++ b/Az durable functions.pptx
@@ -497,6 +497,1735 @@
     </a:lvl9pPr>
   </p:notesStyle>
 </p:notesMaster>
+</file>
+
+<file path=ppt/notesSlides/notesSlide1.xml><?xml version="1.0" encoding="utf-8"?>
+<p:notes xmlns:a="http://schemas.openxmlformats.org/drawingml/2006/main" xmlns:r="http://schemas.openxmlformats.org/officeDocument/2006/relationships" xmlns:p="http://schemas.openxmlformats.org/presentationml/2006/main">
+  <p:cSld>
+    <p:spTree>
+      <p:nvGrpSpPr>
+        <p:cNvPr id="1" name=""/>
+        <p:cNvGrpSpPr/>
+        <p:nvPr/>
+      </p:nvGrpSpPr>
+      <p:grpSpPr>
+        <a:xfrm>
+          <a:off x="0" y="0"/>
+          <a:ext cx="0" cy="0"/>
+          <a:chOff x="0" y="0"/>
+          <a:chExt cx="0" cy="0"/>
+        </a:xfrm>
+      </p:grpSpPr>
+      <p:sp>
+        <p:nvSpPr>
+          <p:cNvPr id="2" name="Slide Image Placeholder 1"/>
+          <p:cNvSpPr>
+            <a:spLocks noGrp="1" noRot="1" noChangeAspect="1"/>
+          </p:cNvSpPr>
+          <p:nvPr>
+            <p:ph type="sldImg"/>
+          </p:nvPr>
+        </p:nvSpPr>
+        <p:spPr/>
+      </p:sp>
+      <p:sp>
+        <p:nvSpPr>
+          <p:cNvPr id="3" name="Notes Placeholder 2"/>
+          <p:cNvSpPr>
+            <a:spLocks noGrp="1"/>
+          </p:cNvSpPr>
+          <p:nvPr>
+            <p:ph type="body" idx="1"/>
+          </p:nvPr>
+        </p:nvSpPr>
+        <p:spPr/>
+        <p:txBody>
+          <a:bodyPr/>
+          <a:lstStyle/>
+          <a:p>
+            <a:r>
+              <a:rPr lang="en-SE" dirty="0" err="1"/>
+              <a:t>Språk</a:t>
+            </a:r>
+            <a:r>
+              <a:rPr lang="en-SE" dirty="0"/>
+              <a:t>: </a:t>
+            </a:r>
+          </a:p>
+          <a:p>
+            <a:r>
+              <a:rPr lang="en-SE" dirty="0"/>
+              <a:t>C#, Java, JS (</a:t>
+            </a:r>
+            <a:r>
+              <a:rPr lang="en-SE" dirty="0" err="1"/>
+              <a:t>nodejs</a:t>
+            </a:r>
+            <a:r>
+              <a:rPr lang="en-SE" dirty="0"/>
+              <a:t>, typescript), Ps, Python</a:t>
+            </a:r>
+          </a:p>
+          <a:p>
+            <a:endParaRPr lang="en-SE" dirty="0"/>
+          </a:p>
+          <a:p>
+            <a:r>
+              <a:rPr lang="en-SE" dirty="0"/>
+              <a:t>Custom handler ger </a:t>
+            </a:r>
+            <a:r>
+              <a:rPr lang="en-SE" dirty="0" err="1"/>
+              <a:t>stöd</a:t>
+            </a:r>
+            <a:r>
+              <a:rPr lang="en-SE" dirty="0"/>
+              <a:t> </a:t>
+            </a:r>
+            <a:r>
+              <a:rPr lang="en-SE" dirty="0" err="1"/>
+              <a:t>för</a:t>
+            </a:r>
+            <a:r>
+              <a:rPr lang="en-SE" dirty="0"/>
+              <a:t> </a:t>
+            </a:r>
+            <a:r>
+              <a:rPr lang="en-SE" dirty="0" err="1"/>
+              <a:t>nästan</a:t>
+            </a:r>
+            <a:r>
+              <a:rPr lang="en-SE" dirty="0"/>
+              <a:t> </a:t>
+            </a:r>
+            <a:r>
+              <a:rPr lang="en-SE" dirty="0" err="1"/>
+              <a:t>vilket</a:t>
+            </a:r>
+            <a:r>
+              <a:rPr lang="en-SE" dirty="0"/>
+              <a:t> </a:t>
+            </a:r>
+            <a:r>
+              <a:rPr lang="en-SE" dirty="0" err="1"/>
+              <a:t>språk</a:t>
+            </a:r>
+            <a:r>
+              <a:rPr lang="en-SE" dirty="0"/>
+              <a:t> </a:t>
+            </a:r>
+            <a:r>
+              <a:rPr lang="en-SE" dirty="0" err="1"/>
+              <a:t>som</a:t>
+            </a:r>
+            <a:r>
+              <a:rPr lang="en-SE" dirty="0"/>
+              <a:t> </a:t>
+            </a:r>
+            <a:r>
+              <a:rPr lang="en-SE" dirty="0" err="1"/>
+              <a:t>helst</a:t>
+            </a:r>
+            <a:r>
+              <a:rPr lang="en-SE" dirty="0"/>
+              <a:t>, </a:t>
+            </a:r>
+            <a:r>
+              <a:rPr lang="en-SE" dirty="0" err="1"/>
+              <a:t>där</a:t>
+            </a:r>
+            <a:r>
+              <a:rPr lang="en-SE" dirty="0"/>
+              <a:t> det </a:t>
+            </a:r>
+            <a:r>
+              <a:rPr lang="en-SE" dirty="0" err="1"/>
+              <a:t>finns</a:t>
+            </a:r>
+            <a:r>
+              <a:rPr lang="en-SE" dirty="0"/>
+              <a:t> bra </a:t>
+            </a:r>
+            <a:r>
+              <a:rPr lang="en-SE" dirty="0" err="1"/>
+              <a:t>dokumentation</a:t>
+            </a:r>
+            <a:r>
+              <a:rPr lang="en-SE" dirty="0"/>
+              <a:t> </a:t>
+            </a:r>
+            <a:r>
+              <a:rPr lang="en-SE" dirty="0" err="1"/>
+              <a:t>för</a:t>
+            </a:r>
+            <a:r>
+              <a:rPr lang="en-SE" dirty="0"/>
+              <a:t> Go </a:t>
+            </a:r>
+            <a:r>
+              <a:rPr lang="en-SE" dirty="0" err="1"/>
+              <a:t>och</a:t>
+            </a:r>
+            <a:r>
+              <a:rPr lang="en-SE" dirty="0"/>
+              <a:t> Rust.</a:t>
+            </a:r>
+          </a:p>
+        </p:txBody>
+      </p:sp>
+      <p:sp>
+        <p:nvSpPr>
+          <p:cNvPr id="4" name="Slide Number Placeholder 3"/>
+          <p:cNvSpPr>
+            <a:spLocks noGrp="1"/>
+          </p:cNvSpPr>
+          <p:nvPr>
+            <p:ph type="sldNum" sz="quarter" idx="5"/>
+          </p:nvPr>
+        </p:nvSpPr>
+        <p:spPr/>
+        <p:txBody>
+          <a:bodyPr/>
+          <a:lstStyle/>
+          <a:p>
+            <a:fld id="{C6531923-F268-44F8-924B-792C0EE4DA95}" type="slidenum">
+              <a:rPr lang="en-SE" smtClean="0"/>
+              <a:t>5</a:t>
+            </a:fld>
+            <a:endParaRPr lang="en-SE"/>
+          </a:p>
+        </p:txBody>
+      </p:sp>
+    </p:spTree>
+    <p:extLst>
+      <p:ext uri="{BB962C8B-B14F-4D97-AF65-F5344CB8AC3E}">
+        <p14:creationId xmlns:p14="http://schemas.microsoft.com/office/powerpoint/2010/main" val="2401975098"/>
+      </p:ext>
+    </p:extLst>
+  </p:cSld>
+  <p:clrMapOvr>
+    <a:masterClrMapping/>
+  </p:clrMapOvr>
+</p:notes>
+</file>
+
+<file path=ppt/notesSlides/notesSlide2.xml><?xml version="1.0" encoding="utf-8"?>
+<p:notes xmlns:a="http://schemas.openxmlformats.org/drawingml/2006/main" xmlns:r="http://schemas.openxmlformats.org/officeDocument/2006/relationships" xmlns:p="http://schemas.openxmlformats.org/presentationml/2006/main">
+  <p:cSld>
+    <p:spTree>
+      <p:nvGrpSpPr>
+        <p:cNvPr id="1" name=""/>
+        <p:cNvGrpSpPr/>
+        <p:nvPr/>
+      </p:nvGrpSpPr>
+      <p:grpSpPr>
+        <a:xfrm>
+          <a:off x="0" y="0"/>
+          <a:ext cx="0" cy="0"/>
+          <a:chOff x="0" y="0"/>
+          <a:chExt cx="0" cy="0"/>
+        </a:xfrm>
+      </p:grpSpPr>
+      <p:sp>
+        <p:nvSpPr>
+          <p:cNvPr id="2" name="Slide Image Placeholder 1"/>
+          <p:cNvSpPr>
+            <a:spLocks noGrp="1" noRot="1" noChangeAspect="1"/>
+          </p:cNvSpPr>
+          <p:nvPr>
+            <p:ph type="sldImg"/>
+          </p:nvPr>
+        </p:nvSpPr>
+        <p:spPr/>
+      </p:sp>
+      <p:sp>
+        <p:nvSpPr>
+          <p:cNvPr id="3" name="Notes Placeholder 2"/>
+          <p:cNvSpPr>
+            <a:spLocks noGrp="1"/>
+          </p:cNvSpPr>
+          <p:nvPr>
+            <p:ph type="body" idx="1"/>
+          </p:nvPr>
+        </p:nvSpPr>
+        <p:spPr/>
+        <p:txBody>
+          <a:bodyPr/>
+          <a:lstStyle/>
+          <a:p>
+            <a:r>
+              <a:rPr lang="en-SE" dirty="0"/>
+              <a:t>Visa </a:t>
+            </a:r>
+            <a:r>
+              <a:rPr lang="en-SE" dirty="0" err="1"/>
+              <a:t>olika</a:t>
+            </a:r>
+            <a:r>
+              <a:rPr lang="en-SE" dirty="0"/>
+              <a:t> </a:t>
+            </a:r>
+            <a:r>
+              <a:rPr lang="en-SE" dirty="0" err="1"/>
+              <a:t>typer</a:t>
+            </a:r>
+            <a:r>
+              <a:rPr lang="en-SE" dirty="0"/>
+              <a:t> av triggers </a:t>
+            </a:r>
+            <a:r>
+              <a:rPr lang="en-SE" dirty="0" err="1"/>
+              <a:t>och</a:t>
+            </a:r>
+            <a:r>
+              <a:rPr lang="en-SE" dirty="0"/>
+              <a:t> bindings.</a:t>
+            </a:r>
+          </a:p>
+          <a:p>
+            <a:endParaRPr lang="en-SE" dirty="0"/>
+          </a:p>
+          <a:p>
+            <a:r>
+              <a:rPr lang="en-SE" dirty="0"/>
+              <a:t>Visa model bindings: Lite </a:t>
+            </a:r>
+            <a:r>
+              <a:rPr lang="en-SE" dirty="0" err="1"/>
+              <a:t>hemlig</a:t>
+            </a:r>
+            <a:r>
+              <a:rPr lang="en-SE" dirty="0"/>
+              <a:t> feature </a:t>
+            </a:r>
+            <a:r>
+              <a:rPr lang="en-SE" dirty="0" err="1"/>
+              <a:t>tycker</a:t>
+            </a:r>
+            <a:r>
+              <a:rPr lang="en-SE" dirty="0"/>
+              <a:t> jag, men om man </a:t>
+            </a:r>
+            <a:r>
+              <a:rPr lang="en-SE" dirty="0" err="1"/>
+              <a:t>är</a:t>
+            </a:r>
+            <a:r>
+              <a:rPr lang="en-SE" dirty="0"/>
+              <a:t> van vid asp.net </a:t>
+            </a:r>
+            <a:r>
+              <a:rPr lang="en-SE" dirty="0" err="1"/>
+              <a:t>mvc</a:t>
+            </a:r>
+            <a:r>
+              <a:rPr lang="en-SE" dirty="0"/>
+              <a:t> (core) </a:t>
+            </a:r>
+            <a:r>
+              <a:rPr lang="en-SE" dirty="0" err="1"/>
+              <a:t>och</a:t>
+            </a:r>
+            <a:r>
+              <a:rPr lang="en-SE" dirty="0"/>
+              <a:t> </a:t>
+            </a:r>
+            <a:r>
+              <a:rPr lang="en-SE" dirty="0" err="1"/>
+              <a:t>dess</a:t>
+            </a:r>
+            <a:r>
+              <a:rPr lang="en-SE" dirty="0"/>
+              <a:t> model binding </a:t>
+            </a:r>
+            <a:r>
+              <a:rPr lang="en-SE" dirty="0" err="1"/>
+              <a:t>så</a:t>
+            </a:r>
+            <a:r>
+              <a:rPr lang="en-SE" dirty="0"/>
+              <a:t> </a:t>
+            </a:r>
+            <a:r>
+              <a:rPr lang="en-SE" dirty="0" err="1"/>
+              <a:t>är</a:t>
+            </a:r>
+            <a:r>
+              <a:rPr lang="en-SE" dirty="0"/>
+              <a:t> det fin </a:t>
+            </a:r>
+            <a:r>
+              <a:rPr lang="en-SE" dirty="0" err="1"/>
+              <a:t>att</a:t>
+            </a:r>
+            <a:r>
+              <a:rPr lang="en-SE" dirty="0"/>
+              <a:t> </a:t>
+            </a:r>
+            <a:r>
+              <a:rPr lang="en-SE" dirty="0" err="1"/>
+              <a:t>kunna</a:t>
+            </a:r>
+            <a:endParaRPr lang="en-SE" dirty="0"/>
+          </a:p>
+          <a:p>
+            <a:endParaRPr lang="en-SE" dirty="0"/>
+          </a:p>
+        </p:txBody>
+      </p:sp>
+      <p:sp>
+        <p:nvSpPr>
+          <p:cNvPr id="4" name="Slide Number Placeholder 3"/>
+          <p:cNvSpPr>
+            <a:spLocks noGrp="1"/>
+          </p:cNvSpPr>
+          <p:nvPr>
+            <p:ph type="sldNum" sz="quarter" idx="5"/>
+          </p:nvPr>
+        </p:nvSpPr>
+        <p:spPr/>
+        <p:txBody>
+          <a:bodyPr/>
+          <a:lstStyle/>
+          <a:p>
+            <a:fld id="{C6531923-F268-44F8-924B-792C0EE4DA95}" type="slidenum">
+              <a:rPr lang="en-SE" smtClean="0"/>
+              <a:t>6</a:t>
+            </a:fld>
+            <a:endParaRPr lang="en-SE"/>
+          </a:p>
+        </p:txBody>
+      </p:sp>
+    </p:spTree>
+    <p:extLst>
+      <p:ext uri="{BB962C8B-B14F-4D97-AF65-F5344CB8AC3E}">
+        <p14:creationId xmlns:p14="http://schemas.microsoft.com/office/powerpoint/2010/main" val="2881037705"/>
+      </p:ext>
+    </p:extLst>
+  </p:cSld>
+  <p:clrMapOvr>
+    <a:masterClrMapping/>
+  </p:clrMapOvr>
+</p:notes>
+</file>
+
+<file path=ppt/notesSlides/notesSlide3.xml><?xml version="1.0" encoding="utf-8"?>
+<p:notes xmlns:a="http://schemas.openxmlformats.org/drawingml/2006/main" xmlns:r="http://schemas.openxmlformats.org/officeDocument/2006/relationships" xmlns:p="http://schemas.openxmlformats.org/presentationml/2006/main">
+  <p:cSld>
+    <p:spTree>
+      <p:nvGrpSpPr>
+        <p:cNvPr id="1" name=""/>
+        <p:cNvGrpSpPr/>
+        <p:nvPr/>
+      </p:nvGrpSpPr>
+      <p:grpSpPr>
+        <a:xfrm>
+          <a:off x="0" y="0"/>
+          <a:ext cx="0" cy="0"/>
+          <a:chOff x="0" y="0"/>
+          <a:chExt cx="0" cy="0"/>
+        </a:xfrm>
+      </p:grpSpPr>
+      <p:sp>
+        <p:nvSpPr>
+          <p:cNvPr id="2" name="Slide Image Placeholder 1"/>
+          <p:cNvSpPr>
+            <a:spLocks noGrp="1" noRot="1" noChangeAspect="1"/>
+          </p:cNvSpPr>
+          <p:nvPr>
+            <p:ph type="sldImg"/>
+          </p:nvPr>
+        </p:nvSpPr>
+        <p:spPr/>
+      </p:sp>
+      <p:sp>
+        <p:nvSpPr>
+          <p:cNvPr id="3" name="Notes Placeholder 2"/>
+          <p:cNvSpPr>
+            <a:spLocks noGrp="1"/>
+          </p:cNvSpPr>
+          <p:nvPr>
+            <p:ph type="body" idx="1"/>
+          </p:nvPr>
+        </p:nvSpPr>
+        <p:spPr/>
+        <p:txBody>
+          <a:bodyPr/>
+          <a:lstStyle/>
+          <a:p>
+            <a:r>
+              <a:rPr lang="en-SE" dirty="0"/>
+              <a:t>Use case: Inom </a:t>
+            </a:r>
+            <a:r>
+              <a:rPr lang="en-SE" dirty="0" err="1"/>
+              <a:t>samma</a:t>
+            </a:r>
+            <a:r>
+              <a:rPr lang="en-SE" dirty="0"/>
+              <a:t> function app, </a:t>
+            </a:r>
+            <a:r>
+              <a:rPr lang="en-SE" dirty="0" err="1"/>
+              <a:t>kör</a:t>
+            </a:r>
+            <a:r>
+              <a:rPr lang="en-SE" dirty="0"/>
+              <a:t> functions </a:t>
+            </a:r>
+            <a:r>
+              <a:rPr lang="en-SE" dirty="0" err="1"/>
+              <a:t>i</a:t>
+            </a:r>
+            <a:r>
+              <a:rPr lang="en-SE" dirty="0"/>
+              <a:t> </a:t>
+            </a:r>
+            <a:r>
+              <a:rPr lang="en-SE" dirty="0" err="1"/>
+              <a:t>specifik</a:t>
+            </a:r>
+            <a:r>
+              <a:rPr lang="en-SE" dirty="0"/>
+              <a:t> </a:t>
+            </a:r>
+            <a:r>
+              <a:rPr lang="en-SE" dirty="0" err="1"/>
+              <a:t>ordning</a:t>
+            </a:r>
+            <a:r>
+              <a:rPr lang="en-SE" dirty="0"/>
+              <a:t> </a:t>
+            </a:r>
+            <a:r>
+              <a:rPr lang="en-SE" dirty="0" err="1"/>
+              <a:t>där</a:t>
+            </a:r>
+            <a:r>
+              <a:rPr lang="en-SE" dirty="0"/>
+              <a:t> input till </a:t>
+            </a:r>
+            <a:r>
+              <a:rPr lang="en-SE" dirty="0" err="1"/>
+              <a:t>en</a:t>
+            </a:r>
+            <a:r>
+              <a:rPr lang="en-SE" dirty="0"/>
+              <a:t> fun</a:t>
+            </a:r>
+            <a:r>
+              <a:rPr lang="sv-SE" dirty="0"/>
+              <a:t>c</a:t>
+            </a:r>
+            <a:r>
+              <a:rPr lang="en-SE" dirty="0" err="1"/>
+              <a:t>tion</a:t>
+            </a:r>
+            <a:r>
+              <a:rPr lang="en-SE" dirty="0"/>
+              <a:t> </a:t>
+            </a:r>
+            <a:r>
+              <a:rPr lang="en-SE" dirty="0" err="1"/>
+              <a:t>är</a:t>
+            </a:r>
+            <a:r>
+              <a:rPr lang="en-SE" dirty="0"/>
+              <a:t> </a:t>
+            </a:r>
+            <a:r>
+              <a:rPr lang="en-SE" dirty="0" err="1"/>
+              <a:t>från</a:t>
+            </a:r>
+            <a:r>
+              <a:rPr lang="en-SE" dirty="0"/>
+              <a:t> output av </a:t>
+            </a:r>
+            <a:r>
+              <a:rPr lang="en-SE" dirty="0" err="1"/>
+              <a:t>en</a:t>
+            </a:r>
+            <a:r>
+              <a:rPr lang="en-SE" dirty="0"/>
+              <a:t> </a:t>
+            </a:r>
+            <a:r>
+              <a:rPr lang="en-SE" dirty="0" err="1"/>
+              <a:t>annan</a:t>
+            </a:r>
+            <a:r>
+              <a:rPr lang="en-SE" dirty="0"/>
+              <a:t>.</a:t>
+            </a:r>
+          </a:p>
+        </p:txBody>
+      </p:sp>
+      <p:sp>
+        <p:nvSpPr>
+          <p:cNvPr id="4" name="Slide Number Placeholder 3"/>
+          <p:cNvSpPr>
+            <a:spLocks noGrp="1"/>
+          </p:cNvSpPr>
+          <p:nvPr>
+            <p:ph type="sldNum" sz="quarter" idx="5"/>
+          </p:nvPr>
+        </p:nvSpPr>
+        <p:spPr/>
+        <p:txBody>
+          <a:bodyPr/>
+          <a:lstStyle/>
+          <a:p>
+            <a:fld id="{C6531923-F268-44F8-924B-792C0EE4DA95}" type="slidenum">
+              <a:rPr lang="en-SE" smtClean="0"/>
+              <a:t>9</a:t>
+            </a:fld>
+            <a:endParaRPr lang="en-SE"/>
+          </a:p>
+        </p:txBody>
+      </p:sp>
+    </p:spTree>
+    <p:extLst>
+      <p:ext uri="{BB962C8B-B14F-4D97-AF65-F5344CB8AC3E}">
+        <p14:creationId xmlns:p14="http://schemas.microsoft.com/office/powerpoint/2010/main" val="1291696354"/>
+      </p:ext>
+    </p:extLst>
+  </p:cSld>
+  <p:clrMapOvr>
+    <a:masterClrMapping/>
+  </p:clrMapOvr>
+</p:notes>
+</file>
+
+<file path=ppt/notesSlides/notesSlide4.xml><?xml version="1.0" encoding="utf-8"?>
+<p:notes xmlns:a="http://schemas.openxmlformats.org/drawingml/2006/main" xmlns:r="http://schemas.openxmlformats.org/officeDocument/2006/relationships" xmlns:p="http://schemas.openxmlformats.org/presentationml/2006/main">
+  <p:cSld>
+    <p:spTree>
+      <p:nvGrpSpPr>
+        <p:cNvPr id="1" name=""/>
+        <p:cNvGrpSpPr/>
+        <p:nvPr/>
+      </p:nvGrpSpPr>
+      <p:grpSpPr>
+        <a:xfrm>
+          <a:off x="0" y="0"/>
+          <a:ext cx="0" cy="0"/>
+          <a:chOff x="0" y="0"/>
+          <a:chExt cx="0" cy="0"/>
+        </a:xfrm>
+      </p:grpSpPr>
+      <p:sp>
+        <p:nvSpPr>
+          <p:cNvPr id="2" name="Slide Image Placeholder 1"/>
+          <p:cNvSpPr>
+            <a:spLocks noGrp="1" noRot="1" noChangeAspect="1"/>
+          </p:cNvSpPr>
+          <p:nvPr>
+            <p:ph type="sldImg"/>
+          </p:nvPr>
+        </p:nvSpPr>
+        <p:spPr/>
+      </p:sp>
+      <p:sp>
+        <p:nvSpPr>
+          <p:cNvPr id="3" name="Notes Placeholder 2"/>
+          <p:cNvSpPr>
+            <a:spLocks noGrp="1"/>
+          </p:cNvSpPr>
+          <p:nvPr>
+            <p:ph type="body" idx="1"/>
+          </p:nvPr>
+        </p:nvSpPr>
+        <p:spPr/>
+        <p:txBody>
+          <a:bodyPr/>
+          <a:lstStyle/>
+          <a:p>
+            <a:r>
+              <a:rPr lang="en-SE" dirty="0"/>
+              <a:t>Use case: </a:t>
+            </a:r>
+            <a:r>
+              <a:rPr lang="en-SE" dirty="0" err="1"/>
+              <a:t>Ersätter</a:t>
+            </a:r>
+            <a:r>
+              <a:rPr lang="en-SE" dirty="0"/>
+              <a:t> </a:t>
+            </a:r>
+            <a:r>
+              <a:rPr lang="en-SE" dirty="0" err="1"/>
+              <a:t>systemdesignen</a:t>
+            </a:r>
+            <a:r>
+              <a:rPr lang="en-SE" dirty="0"/>
+              <a:t> </a:t>
+            </a:r>
+            <a:r>
+              <a:rPr lang="en-SE" dirty="0" err="1"/>
+              <a:t>att</a:t>
+            </a:r>
+            <a:r>
+              <a:rPr lang="en-SE" dirty="0"/>
+              <a:t> </a:t>
+            </a:r>
+            <a:r>
+              <a:rPr lang="en-SE" dirty="0" err="1"/>
+              <a:t>skicka</a:t>
+            </a:r>
+            <a:r>
+              <a:rPr lang="en-SE" dirty="0"/>
+              <a:t> </a:t>
+            </a:r>
+            <a:r>
+              <a:rPr lang="en-SE" dirty="0" err="1"/>
+              <a:t>multipla</a:t>
+            </a:r>
+            <a:r>
+              <a:rPr lang="en-SE" dirty="0"/>
+              <a:t> </a:t>
+            </a:r>
+            <a:r>
+              <a:rPr lang="en-SE" dirty="0" err="1"/>
+              <a:t>meddelanden</a:t>
+            </a:r>
+            <a:r>
+              <a:rPr lang="en-SE" dirty="0"/>
+              <a:t> till </a:t>
+            </a:r>
+            <a:r>
+              <a:rPr lang="en-SE" dirty="0" err="1"/>
+              <a:t>en</a:t>
+            </a:r>
+            <a:r>
+              <a:rPr lang="en-SE" dirty="0"/>
+              <a:t> </a:t>
+            </a:r>
+            <a:r>
+              <a:rPr lang="en-SE" dirty="0" err="1"/>
+              <a:t>kö</a:t>
+            </a:r>
+            <a:r>
+              <a:rPr lang="en-SE" dirty="0"/>
+              <a:t>, </a:t>
+            </a:r>
+            <a:r>
+              <a:rPr lang="en-SE" dirty="0" err="1"/>
+              <a:t>låta</a:t>
+            </a:r>
+            <a:r>
+              <a:rPr lang="en-SE" dirty="0"/>
+              <a:t> den betas av </a:t>
+            </a:r>
+            <a:r>
+              <a:rPr lang="en-SE" dirty="0" err="1"/>
+              <a:t>av</a:t>
+            </a:r>
+            <a:r>
+              <a:rPr lang="en-SE" dirty="0"/>
+              <a:t> </a:t>
+            </a:r>
+            <a:r>
+              <a:rPr lang="en-SE" dirty="0" err="1"/>
+              <a:t>flera</a:t>
+            </a:r>
+            <a:r>
+              <a:rPr lang="en-SE" dirty="0"/>
+              <a:t> </a:t>
+            </a:r>
+            <a:r>
+              <a:rPr lang="en-SE" dirty="0" err="1"/>
+              <a:t>instanser</a:t>
+            </a:r>
+            <a:r>
+              <a:rPr lang="en-SE" dirty="0"/>
+              <a:t> av </a:t>
+            </a:r>
+            <a:r>
+              <a:rPr lang="en-SE" dirty="0" err="1"/>
+              <a:t>en</a:t>
+            </a:r>
+            <a:r>
+              <a:rPr lang="en-SE" dirty="0"/>
+              <a:t> </a:t>
+            </a:r>
+            <a:r>
+              <a:rPr lang="en-SE" dirty="0" err="1"/>
+              <a:t>funktion</a:t>
+            </a:r>
+            <a:r>
+              <a:rPr lang="en-SE" dirty="0"/>
+              <a:t> </a:t>
+            </a:r>
+            <a:r>
+              <a:rPr lang="en-SE" dirty="0" err="1"/>
+              <a:t>och</a:t>
+            </a:r>
+            <a:r>
+              <a:rPr lang="en-SE" dirty="0"/>
+              <a:t> </a:t>
+            </a:r>
+            <a:r>
+              <a:rPr lang="en-SE" dirty="0" err="1"/>
+              <a:t>sen</a:t>
+            </a:r>
+            <a:r>
+              <a:rPr lang="en-SE" dirty="0"/>
+              <a:t> </a:t>
+            </a:r>
+            <a:r>
+              <a:rPr lang="en-SE" dirty="0" err="1"/>
+              <a:t>synkronisera</a:t>
+            </a:r>
+            <a:r>
+              <a:rPr lang="en-SE" dirty="0"/>
+              <a:t> </a:t>
+            </a:r>
+            <a:r>
+              <a:rPr lang="en-SE" dirty="0" err="1"/>
+              <a:t>tillbaka</a:t>
+            </a:r>
+            <a:r>
+              <a:rPr lang="en-SE" dirty="0"/>
+              <a:t> </a:t>
+            </a:r>
+            <a:r>
+              <a:rPr lang="en-SE" dirty="0" err="1"/>
+              <a:t>allt</a:t>
+            </a:r>
+            <a:r>
+              <a:rPr lang="en-SE" dirty="0"/>
+              <a:t> </a:t>
+            </a:r>
+            <a:r>
+              <a:rPr lang="en-SE" dirty="0" err="1"/>
+              <a:t>igen</a:t>
+            </a:r>
+            <a:r>
+              <a:rPr lang="en-SE" dirty="0"/>
+              <a:t>. </a:t>
+            </a:r>
+            <a:r>
+              <a:rPr lang="en-SE" dirty="0" err="1"/>
+              <a:t>Här</a:t>
+            </a:r>
+            <a:r>
+              <a:rPr lang="en-SE" dirty="0"/>
+              <a:t> </a:t>
+            </a:r>
+            <a:r>
+              <a:rPr lang="en-SE" dirty="0" err="1"/>
+              <a:t>får</a:t>
+            </a:r>
+            <a:r>
+              <a:rPr lang="en-SE" dirty="0"/>
+              <a:t> man fan-in </a:t>
+            </a:r>
+            <a:r>
+              <a:rPr lang="en-SE" dirty="0" err="1"/>
+              <a:t>på</a:t>
+            </a:r>
+            <a:r>
+              <a:rPr lang="en-SE" dirty="0"/>
+              <a:t> </a:t>
+            </a:r>
+            <a:r>
+              <a:rPr lang="en-SE" dirty="0" err="1"/>
+              <a:t>köpet</a:t>
+            </a:r>
+            <a:r>
+              <a:rPr lang="en-SE" dirty="0"/>
+              <a:t> </a:t>
+            </a:r>
+            <a:r>
+              <a:rPr lang="en-SE" dirty="0" err="1"/>
+              <a:t>iom</a:t>
+            </a:r>
+            <a:r>
+              <a:rPr lang="en-SE" dirty="0"/>
+              <a:t> </a:t>
+            </a:r>
+            <a:r>
+              <a:rPr lang="en-SE" dirty="0" err="1"/>
+              <a:t>Task.WhenAll</a:t>
+            </a:r>
+            <a:r>
+              <a:rPr lang="en-SE" dirty="0"/>
+              <a:t>(...).</a:t>
+            </a:r>
+          </a:p>
+        </p:txBody>
+      </p:sp>
+      <p:sp>
+        <p:nvSpPr>
+          <p:cNvPr id="4" name="Slide Number Placeholder 3"/>
+          <p:cNvSpPr>
+            <a:spLocks noGrp="1"/>
+          </p:cNvSpPr>
+          <p:nvPr>
+            <p:ph type="sldNum" sz="quarter" idx="5"/>
+          </p:nvPr>
+        </p:nvSpPr>
+        <p:spPr/>
+        <p:txBody>
+          <a:bodyPr/>
+          <a:lstStyle/>
+          <a:p>
+            <a:fld id="{C6531923-F268-44F8-924B-792C0EE4DA95}" type="slidenum">
+              <a:rPr lang="en-SE" smtClean="0"/>
+              <a:t>10</a:t>
+            </a:fld>
+            <a:endParaRPr lang="en-SE"/>
+          </a:p>
+        </p:txBody>
+      </p:sp>
+    </p:spTree>
+    <p:extLst>
+      <p:ext uri="{BB962C8B-B14F-4D97-AF65-F5344CB8AC3E}">
+        <p14:creationId xmlns:p14="http://schemas.microsoft.com/office/powerpoint/2010/main" val="3690333229"/>
+      </p:ext>
+    </p:extLst>
+  </p:cSld>
+  <p:clrMapOvr>
+    <a:masterClrMapping/>
+  </p:clrMapOvr>
+</p:notes>
+</file>
+
+<file path=ppt/notesSlides/notesSlide5.xml><?xml version="1.0" encoding="utf-8"?>
+<p:notes xmlns:a="http://schemas.openxmlformats.org/drawingml/2006/main" xmlns:r="http://schemas.openxmlformats.org/officeDocument/2006/relationships" xmlns:p="http://schemas.openxmlformats.org/presentationml/2006/main">
+  <p:cSld>
+    <p:spTree>
+      <p:nvGrpSpPr>
+        <p:cNvPr id="1" name=""/>
+        <p:cNvGrpSpPr/>
+        <p:nvPr/>
+      </p:nvGrpSpPr>
+      <p:grpSpPr>
+        <a:xfrm>
+          <a:off x="0" y="0"/>
+          <a:ext cx="0" cy="0"/>
+          <a:chOff x="0" y="0"/>
+          <a:chExt cx="0" cy="0"/>
+        </a:xfrm>
+      </p:grpSpPr>
+      <p:sp>
+        <p:nvSpPr>
+          <p:cNvPr id="2" name="Slide Image Placeholder 1"/>
+          <p:cNvSpPr>
+            <a:spLocks noGrp="1" noRot="1" noChangeAspect="1"/>
+          </p:cNvSpPr>
+          <p:nvPr>
+            <p:ph type="sldImg"/>
+          </p:nvPr>
+        </p:nvSpPr>
+        <p:spPr/>
+      </p:sp>
+      <p:sp>
+        <p:nvSpPr>
+          <p:cNvPr id="3" name="Notes Placeholder 2"/>
+          <p:cNvSpPr>
+            <a:spLocks noGrp="1"/>
+          </p:cNvSpPr>
+          <p:nvPr>
+            <p:ph type="body" idx="1"/>
+          </p:nvPr>
+        </p:nvSpPr>
+        <p:spPr/>
+        <p:txBody>
+          <a:bodyPr/>
+          <a:lstStyle/>
+          <a:p>
+            <a:r>
+              <a:rPr lang="en-SE" dirty="0"/>
+              <a:t>U</a:t>
+            </a:r>
+            <a:r>
+              <a:rPr lang="sv-SE" dirty="0"/>
+              <a:t>s</a:t>
+            </a:r>
+            <a:r>
+              <a:rPr lang="en-SE" dirty="0"/>
+              <a:t>e case: </a:t>
+            </a:r>
+            <a:r>
+              <a:rPr lang="en-SE" dirty="0" err="1"/>
+              <a:t>Bankid-inloggning</a:t>
+            </a:r>
+            <a:r>
+              <a:rPr lang="en-SE" dirty="0"/>
+              <a:t>/</a:t>
+            </a:r>
+            <a:r>
+              <a:rPr lang="en-SE" dirty="0" err="1"/>
+              <a:t>signering</a:t>
+            </a:r>
+            <a:r>
+              <a:rPr lang="en-SE" dirty="0"/>
+              <a:t> -&gt; </a:t>
+            </a:r>
+            <a:r>
+              <a:rPr lang="en-SE" dirty="0" err="1"/>
+              <a:t>Sätt</a:t>
+            </a:r>
+            <a:r>
+              <a:rPr lang="en-SE" dirty="0"/>
+              <a:t> </a:t>
+            </a:r>
+            <a:r>
+              <a:rPr lang="en-SE" dirty="0" err="1"/>
+              <a:t>igång</a:t>
+            </a:r>
+            <a:r>
+              <a:rPr lang="en-SE" dirty="0"/>
+              <a:t> </a:t>
+            </a:r>
+            <a:r>
+              <a:rPr lang="en-SE" dirty="0" err="1"/>
+              <a:t>en</a:t>
+            </a:r>
+            <a:r>
+              <a:rPr lang="en-SE" dirty="0"/>
+              <a:t> </a:t>
+            </a:r>
+            <a:r>
+              <a:rPr lang="en-SE" dirty="0" err="1"/>
+              <a:t>inloggning</a:t>
+            </a:r>
+            <a:r>
+              <a:rPr lang="en-SE" dirty="0"/>
+              <a:t>, </a:t>
+            </a:r>
+            <a:r>
+              <a:rPr lang="en-SE" dirty="0" err="1"/>
+              <a:t>vänta</a:t>
+            </a:r>
+            <a:r>
+              <a:rPr lang="en-SE" dirty="0"/>
+              <a:t> </a:t>
+            </a:r>
+            <a:r>
+              <a:rPr lang="en-SE" dirty="0" err="1"/>
+              <a:t>på</a:t>
+            </a:r>
+            <a:r>
+              <a:rPr lang="en-SE" dirty="0"/>
+              <a:t> </a:t>
+            </a:r>
+            <a:r>
+              <a:rPr lang="en-SE" dirty="0" err="1"/>
+              <a:t>en</a:t>
+            </a:r>
+            <a:r>
+              <a:rPr lang="en-SE" dirty="0"/>
+              <a:t> </a:t>
+            </a:r>
+            <a:r>
+              <a:rPr lang="en-SE" dirty="0" err="1"/>
+              <a:t>callback</a:t>
+            </a:r>
+            <a:r>
+              <a:rPr lang="en-SE" dirty="0"/>
+              <a:t>, </a:t>
+            </a:r>
+            <a:r>
+              <a:rPr lang="en-SE" dirty="0" err="1"/>
+              <a:t>polla</a:t>
+            </a:r>
+            <a:r>
+              <a:rPr lang="en-SE" dirty="0"/>
+              <a:t> status under </a:t>
+            </a:r>
+            <a:r>
+              <a:rPr lang="en-SE" dirty="0" err="1"/>
+              <a:t>tiden</a:t>
+            </a:r>
+            <a:r>
+              <a:rPr lang="en-SE" dirty="0"/>
+              <a:t> </a:t>
+            </a:r>
+            <a:r>
+              <a:rPr lang="en-SE" dirty="0" err="1"/>
+              <a:t>och</a:t>
+            </a:r>
+            <a:r>
+              <a:rPr lang="en-SE" dirty="0"/>
+              <a:t> </a:t>
+            </a:r>
+            <a:r>
+              <a:rPr lang="en-SE" dirty="0" err="1"/>
+              <a:t>reagera</a:t>
+            </a:r>
+            <a:r>
+              <a:rPr lang="en-SE" dirty="0"/>
+              <a:t> </a:t>
+            </a:r>
+            <a:r>
+              <a:rPr lang="en-SE" dirty="0" err="1"/>
+              <a:t>på</a:t>
+            </a:r>
+            <a:r>
+              <a:rPr lang="en-SE" dirty="0"/>
+              <a:t> </a:t>
+            </a:r>
+            <a:r>
+              <a:rPr lang="en-SE" dirty="0" err="1"/>
+              <a:t>förändring</a:t>
+            </a:r>
+            <a:r>
+              <a:rPr lang="en-SE" dirty="0"/>
+              <a:t> </a:t>
+            </a:r>
+            <a:r>
+              <a:rPr lang="en-SE" dirty="0" err="1"/>
+              <a:t>i</a:t>
+            </a:r>
+            <a:r>
+              <a:rPr lang="en-SE" dirty="0"/>
+              <a:t> status.</a:t>
+            </a:r>
+          </a:p>
+          <a:p>
+            <a:endParaRPr lang="en-SE" dirty="0"/>
+          </a:p>
+          <a:p>
+            <a:r>
+              <a:rPr lang="en-SE" dirty="0"/>
+              <a:t>Mix av human-interaction-m</a:t>
+            </a:r>
+            <a:r>
+              <a:rPr lang="sv-SE" dirty="0"/>
+              <a:t>o</a:t>
+            </a:r>
+            <a:r>
+              <a:rPr lang="en-SE" dirty="0" err="1"/>
+              <a:t>nster</a:t>
+            </a:r>
+            <a:r>
+              <a:rPr lang="en-SE" dirty="0"/>
+              <a:t> </a:t>
+            </a:r>
+            <a:r>
+              <a:rPr lang="en-SE" dirty="0" err="1"/>
+              <a:t>och</a:t>
+            </a:r>
+            <a:r>
+              <a:rPr lang="en-SE" dirty="0"/>
+              <a:t> </a:t>
+            </a:r>
+            <a:r>
+              <a:rPr lang="en-SE" dirty="0" err="1"/>
+              <a:t>denna</a:t>
+            </a:r>
+            <a:r>
+              <a:rPr lang="en-SE" dirty="0"/>
+              <a:t>.</a:t>
+            </a:r>
+          </a:p>
+        </p:txBody>
+      </p:sp>
+      <p:sp>
+        <p:nvSpPr>
+          <p:cNvPr id="4" name="Slide Number Placeholder 3"/>
+          <p:cNvSpPr>
+            <a:spLocks noGrp="1"/>
+          </p:cNvSpPr>
+          <p:nvPr>
+            <p:ph type="sldNum" sz="quarter" idx="5"/>
+          </p:nvPr>
+        </p:nvSpPr>
+        <p:spPr/>
+        <p:txBody>
+          <a:bodyPr/>
+          <a:lstStyle/>
+          <a:p>
+            <a:fld id="{C6531923-F268-44F8-924B-792C0EE4DA95}" type="slidenum">
+              <a:rPr lang="en-SE" smtClean="0"/>
+              <a:t>11</a:t>
+            </a:fld>
+            <a:endParaRPr lang="en-SE"/>
+          </a:p>
+        </p:txBody>
+      </p:sp>
+    </p:spTree>
+    <p:extLst>
+      <p:ext uri="{BB962C8B-B14F-4D97-AF65-F5344CB8AC3E}">
+        <p14:creationId xmlns:p14="http://schemas.microsoft.com/office/powerpoint/2010/main" val="2282873910"/>
+      </p:ext>
+    </p:extLst>
+  </p:cSld>
+  <p:clrMapOvr>
+    <a:masterClrMapping/>
+  </p:clrMapOvr>
+</p:notes>
+</file>
+
+<file path=ppt/notesSlides/notesSlide6.xml><?xml version="1.0" encoding="utf-8"?>
+<p:notes xmlns:a="http://schemas.openxmlformats.org/drawingml/2006/main" xmlns:r="http://schemas.openxmlformats.org/officeDocument/2006/relationships" xmlns:p="http://schemas.openxmlformats.org/presentationml/2006/main">
+  <p:cSld>
+    <p:spTree>
+      <p:nvGrpSpPr>
+        <p:cNvPr id="1" name=""/>
+        <p:cNvGrpSpPr/>
+        <p:nvPr/>
+      </p:nvGrpSpPr>
+      <p:grpSpPr>
+        <a:xfrm>
+          <a:off x="0" y="0"/>
+          <a:ext cx="0" cy="0"/>
+          <a:chOff x="0" y="0"/>
+          <a:chExt cx="0" cy="0"/>
+        </a:xfrm>
+      </p:grpSpPr>
+      <p:sp>
+        <p:nvSpPr>
+          <p:cNvPr id="2" name="Slide Image Placeholder 1"/>
+          <p:cNvSpPr>
+            <a:spLocks noGrp="1" noRot="1" noChangeAspect="1"/>
+          </p:cNvSpPr>
+          <p:nvPr>
+            <p:ph type="sldImg"/>
+          </p:nvPr>
+        </p:nvSpPr>
+        <p:spPr/>
+      </p:sp>
+      <p:sp>
+        <p:nvSpPr>
+          <p:cNvPr id="3" name="Notes Placeholder 2"/>
+          <p:cNvSpPr>
+            <a:spLocks noGrp="1"/>
+          </p:cNvSpPr>
+          <p:nvPr>
+            <p:ph type="body" idx="1"/>
+          </p:nvPr>
+        </p:nvSpPr>
+        <p:spPr/>
+        <p:txBody>
+          <a:bodyPr/>
+          <a:lstStyle/>
+          <a:p>
+            <a:r>
+              <a:rPr lang="en-SE" dirty="0"/>
+              <a:t>Use case: </a:t>
+            </a:r>
+            <a:r>
+              <a:rPr lang="en-SE" dirty="0" err="1"/>
+              <a:t>Periodisk</a:t>
+            </a:r>
+            <a:r>
+              <a:rPr lang="en-SE" dirty="0"/>
+              <a:t> </a:t>
+            </a:r>
+            <a:r>
+              <a:rPr lang="sv-SE" dirty="0"/>
+              <a:t>städning</a:t>
+            </a:r>
+            <a:r>
+              <a:rPr lang="en-SE" dirty="0"/>
+              <a:t> </a:t>
+            </a:r>
+            <a:r>
+              <a:rPr lang="en-SE" dirty="0" err="1"/>
+              <a:t>genom</a:t>
+            </a:r>
+            <a:r>
+              <a:rPr lang="en-SE" dirty="0"/>
+              <a:t> </a:t>
+            </a:r>
+            <a:r>
+              <a:rPr lang="en-SE" dirty="0" err="1"/>
+              <a:t>att</a:t>
+            </a:r>
+            <a:r>
+              <a:rPr lang="en-SE" dirty="0"/>
+              <a:t> </a:t>
+            </a:r>
+            <a:r>
+              <a:rPr lang="en-SE" dirty="0" err="1"/>
+              <a:t>kolla</a:t>
+            </a:r>
+            <a:r>
+              <a:rPr lang="en-SE" dirty="0"/>
+              <a:t> status </a:t>
+            </a:r>
+            <a:r>
+              <a:rPr lang="en-SE" dirty="0" err="1"/>
+              <a:t>och</a:t>
+            </a:r>
+            <a:r>
+              <a:rPr lang="en-SE" dirty="0"/>
+              <a:t> </a:t>
+            </a:r>
+            <a:r>
+              <a:rPr lang="en-SE" dirty="0" err="1"/>
+              <a:t>agera</a:t>
+            </a:r>
+            <a:r>
+              <a:rPr lang="en-SE" dirty="0"/>
+              <a:t> </a:t>
+            </a:r>
+            <a:r>
+              <a:rPr lang="en-SE" dirty="0" err="1"/>
+              <a:t>på</a:t>
+            </a:r>
+            <a:r>
+              <a:rPr lang="en-SE" dirty="0"/>
+              <a:t> </a:t>
+            </a:r>
+            <a:r>
+              <a:rPr lang="en-SE" dirty="0" err="1"/>
+              <a:t>förändringar</a:t>
+            </a:r>
+            <a:r>
+              <a:rPr lang="en-SE" dirty="0"/>
+              <a:t> </a:t>
+            </a:r>
+            <a:r>
+              <a:rPr lang="en-SE" dirty="0" err="1"/>
+              <a:t>i</a:t>
+            </a:r>
+            <a:r>
+              <a:rPr lang="en-SE" dirty="0"/>
+              <a:t> status </a:t>
+            </a:r>
+            <a:r>
+              <a:rPr lang="en-SE" dirty="0" err="1"/>
+              <a:t>istället</a:t>
+            </a:r>
+            <a:r>
+              <a:rPr lang="en-SE" dirty="0"/>
+              <a:t> </a:t>
+            </a:r>
+            <a:r>
+              <a:rPr lang="en-SE" dirty="0" err="1"/>
+              <a:t>för</a:t>
+            </a:r>
+            <a:r>
+              <a:rPr lang="en-SE" dirty="0"/>
+              <a:t> </a:t>
+            </a:r>
+            <a:r>
+              <a:rPr lang="en-SE" dirty="0" err="1"/>
+              <a:t>att</a:t>
+            </a:r>
+            <a:r>
+              <a:rPr lang="en-SE" dirty="0"/>
+              <a:t> vid </a:t>
+            </a:r>
+            <a:r>
+              <a:rPr lang="en-SE" dirty="0" err="1"/>
+              <a:t>fasta</a:t>
+            </a:r>
+            <a:r>
+              <a:rPr lang="en-SE" dirty="0"/>
+              <a:t> </a:t>
+            </a:r>
+            <a:r>
+              <a:rPr lang="en-SE" dirty="0" err="1"/>
+              <a:t>tidpunkter</a:t>
+            </a:r>
+            <a:r>
+              <a:rPr lang="en-SE" dirty="0"/>
+              <a:t> </a:t>
+            </a:r>
+            <a:r>
+              <a:rPr lang="en-SE" dirty="0" err="1"/>
+              <a:t>göra</a:t>
+            </a:r>
+            <a:r>
+              <a:rPr lang="en-SE" dirty="0"/>
+              <a:t> </a:t>
+            </a:r>
+            <a:r>
+              <a:rPr lang="en-SE" dirty="0" err="1"/>
+              <a:t>något</a:t>
+            </a:r>
+            <a:r>
+              <a:rPr lang="en-SE" dirty="0"/>
+              <a:t>.</a:t>
+            </a:r>
+          </a:p>
+        </p:txBody>
+      </p:sp>
+      <p:sp>
+        <p:nvSpPr>
+          <p:cNvPr id="4" name="Slide Number Placeholder 3"/>
+          <p:cNvSpPr>
+            <a:spLocks noGrp="1"/>
+          </p:cNvSpPr>
+          <p:nvPr>
+            <p:ph type="sldNum" sz="quarter" idx="5"/>
+          </p:nvPr>
+        </p:nvSpPr>
+        <p:spPr/>
+        <p:txBody>
+          <a:bodyPr/>
+          <a:lstStyle/>
+          <a:p>
+            <a:fld id="{C6531923-F268-44F8-924B-792C0EE4DA95}" type="slidenum">
+              <a:rPr lang="en-SE" smtClean="0"/>
+              <a:t>12</a:t>
+            </a:fld>
+            <a:endParaRPr lang="en-SE"/>
+          </a:p>
+        </p:txBody>
+      </p:sp>
+    </p:spTree>
+    <p:extLst>
+      <p:ext uri="{BB962C8B-B14F-4D97-AF65-F5344CB8AC3E}">
+        <p14:creationId xmlns:p14="http://schemas.microsoft.com/office/powerpoint/2010/main" val="3730456223"/>
+      </p:ext>
+    </p:extLst>
+  </p:cSld>
+  <p:clrMapOvr>
+    <a:masterClrMapping/>
+  </p:clrMapOvr>
+</p:notes>
+</file>
+
+<file path=ppt/notesSlides/notesSlide7.xml><?xml version="1.0" encoding="utf-8"?>
+<p:notes xmlns:a="http://schemas.openxmlformats.org/drawingml/2006/main" xmlns:r="http://schemas.openxmlformats.org/officeDocument/2006/relationships" xmlns:p="http://schemas.openxmlformats.org/presentationml/2006/main">
+  <p:cSld>
+    <p:spTree>
+      <p:nvGrpSpPr>
+        <p:cNvPr id="1" name=""/>
+        <p:cNvGrpSpPr/>
+        <p:nvPr/>
+      </p:nvGrpSpPr>
+      <p:grpSpPr>
+        <a:xfrm>
+          <a:off x="0" y="0"/>
+          <a:ext cx="0" cy="0"/>
+          <a:chOff x="0" y="0"/>
+          <a:chExt cx="0" cy="0"/>
+        </a:xfrm>
+      </p:grpSpPr>
+      <p:sp>
+        <p:nvSpPr>
+          <p:cNvPr id="2" name="Slide Image Placeholder 1"/>
+          <p:cNvSpPr>
+            <a:spLocks noGrp="1" noRot="1" noChangeAspect="1"/>
+          </p:cNvSpPr>
+          <p:nvPr>
+            <p:ph type="sldImg"/>
+          </p:nvPr>
+        </p:nvSpPr>
+        <p:spPr/>
+      </p:sp>
+      <p:sp>
+        <p:nvSpPr>
+          <p:cNvPr id="3" name="Notes Placeholder 2"/>
+          <p:cNvSpPr>
+            <a:spLocks noGrp="1"/>
+          </p:cNvSpPr>
+          <p:nvPr>
+            <p:ph type="body" idx="1"/>
+          </p:nvPr>
+        </p:nvSpPr>
+        <p:spPr/>
+        <p:txBody>
+          <a:bodyPr/>
+          <a:lstStyle/>
+          <a:p>
+            <a:r>
+              <a:rPr lang="en-SE" dirty="0"/>
+              <a:t>Use case: </a:t>
+            </a:r>
+            <a:r>
+              <a:rPr lang="en-SE" dirty="0" err="1"/>
+              <a:t>Signering</a:t>
+            </a:r>
+            <a:r>
+              <a:rPr lang="en-SE" dirty="0"/>
+              <a:t> av </a:t>
+            </a:r>
+            <a:r>
+              <a:rPr lang="sv-SE" dirty="0"/>
+              <a:t>dokument</a:t>
+            </a:r>
+            <a:r>
+              <a:rPr lang="en-SE" dirty="0"/>
+              <a:t>, attest av faktura etc.</a:t>
+            </a:r>
+          </a:p>
+        </p:txBody>
+      </p:sp>
+      <p:sp>
+        <p:nvSpPr>
+          <p:cNvPr id="4" name="Slide Number Placeholder 3"/>
+          <p:cNvSpPr>
+            <a:spLocks noGrp="1"/>
+          </p:cNvSpPr>
+          <p:nvPr>
+            <p:ph type="sldNum" sz="quarter" idx="5"/>
+          </p:nvPr>
+        </p:nvSpPr>
+        <p:spPr/>
+        <p:txBody>
+          <a:bodyPr/>
+          <a:lstStyle/>
+          <a:p>
+            <a:fld id="{C6531923-F268-44F8-924B-792C0EE4DA95}" type="slidenum">
+              <a:rPr lang="en-SE" smtClean="0"/>
+              <a:t>13</a:t>
+            </a:fld>
+            <a:endParaRPr lang="en-SE"/>
+          </a:p>
+        </p:txBody>
+      </p:sp>
+    </p:spTree>
+    <p:extLst>
+      <p:ext uri="{BB962C8B-B14F-4D97-AF65-F5344CB8AC3E}">
+        <p14:creationId xmlns:p14="http://schemas.microsoft.com/office/powerpoint/2010/main" val="2606704968"/>
+      </p:ext>
+    </p:extLst>
+  </p:cSld>
+  <p:clrMapOvr>
+    <a:masterClrMapping/>
+  </p:clrMapOvr>
+</p:notes>
+</file>
+
+<file path=ppt/notesSlides/notesSlide8.xml><?xml version="1.0" encoding="utf-8"?>
+<p:notes xmlns:a="http://schemas.openxmlformats.org/drawingml/2006/main" xmlns:r="http://schemas.openxmlformats.org/officeDocument/2006/relationships" xmlns:p="http://schemas.openxmlformats.org/presentationml/2006/main">
+  <p:cSld>
+    <p:spTree>
+      <p:nvGrpSpPr>
+        <p:cNvPr id="1" name=""/>
+        <p:cNvGrpSpPr/>
+        <p:nvPr/>
+      </p:nvGrpSpPr>
+      <p:grpSpPr>
+        <a:xfrm>
+          <a:off x="0" y="0"/>
+          <a:ext cx="0" cy="0"/>
+          <a:chOff x="0" y="0"/>
+          <a:chExt cx="0" cy="0"/>
+        </a:xfrm>
+      </p:grpSpPr>
+      <p:sp>
+        <p:nvSpPr>
+          <p:cNvPr id="2" name="Slide Image Placeholder 1"/>
+          <p:cNvSpPr>
+            <a:spLocks noGrp="1" noRot="1" noChangeAspect="1"/>
+          </p:cNvSpPr>
+          <p:nvPr>
+            <p:ph type="sldImg"/>
+          </p:nvPr>
+        </p:nvSpPr>
+        <p:spPr/>
+      </p:sp>
+      <p:sp>
+        <p:nvSpPr>
+          <p:cNvPr id="3" name="Notes Placeholder 2"/>
+          <p:cNvSpPr>
+            <a:spLocks noGrp="1"/>
+          </p:cNvSpPr>
+          <p:nvPr>
+            <p:ph type="body" idx="1"/>
+          </p:nvPr>
+        </p:nvSpPr>
+        <p:spPr/>
+        <p:txBody>
+          <a:bodyPr/>
+          <a:lstStyle/>
+          <a:p>
+            <a:r>
+              <a:rPr lang="en-SE" dirty="0"/>
+              <a:t>Use case: </a:t>
+            </a:r>
+            <a:r>
+              <a:rPr lang="en-SE" dirty="0" err="1"/>
+              <a:t>Aggregering</a:t>
+            </a:r>
+            <a:r>
+              <a:rPr lang="en-SE" dirty="0"/>
+              <a:t> av data </a:t>
+            </a:r>
+            <a:r>
+              <a:rPr lang="en-SE" dirty="0" err="1"/>
+              <a:t>över</a:t>
+            </a:r>
+            <a:r>
+              <a:rPr lang="en-SE" dirty="0"/>
+              <a:t> </a:t>
+            </a:r>
+            <a:r>
+              <a:rPr lang="en-SE" dirty="0" err="1"/>
+              <a:t>tid</a:t>
+            </a:r>
+            <a:r>
+              <a:rPr lang="en-SE" dirty="0"/>
+              <a:t>, </a:t>
+            </a:r>
+            <a:r>
+              <a:rPr lang="en-SE" dirty="0" err="1"/>
+              <a:t>oregelbundet</a:t>
+            </a:r>
+            <a:r>
+              <a:rPr lang="en-SE" dirty="0"/>
+              <a:t> </a:t>
+            </a:r>
+            <a:r>
+              <a:rPr lang="en-SE" dirty="0" err="1"/>
+              <a:t>eller</a:t>
+            </a:r>
+            <a:r>
+              <a:rPr lang="en-SE" dirty="0"/>
+              <a:t> </a:t>
+            </a:r>
+            <a:r>
+              <a:rPr lang="en-SE" dirty="0" err="1"/>
+              <a:t>väldigt</a:t>
+            </a:r>
+            <a:r>
+              <a:rPr lang="en-SE" dirty="0"/>
+              <a:t> </a:t>
+            </a:r>
+            <a:r>
+              <a:rPr lang="en-SE" dirty="0" err="1"/>
+              <a:t>frekevent</a:t>
+            </a:r>
+            <a:r>
+              <a:rPr lang="en-SE" dirty="0"/>
+              <a:t>. </a:t>
+            </a:r>
+            <a:r>
+              <a:rPr lang="en-SE" dirty="0" err="1"/>
+              <a:t>Löser</a:t>
+            </a:r>
+            <a:r>
+              <a:rPr lang="en-SE" dirty="0"/>
+              <a:t> </a:t>
+            </a:r>
+            <a:r>
+              <a:rPr lang="en-SE" dirty="0" err="1"/>
+              <a:t>problemet</a:t>
+            </a:r>
+            <a:r>
+              <a:rPr lang="en-SE" dirty="0"/>
+              <a:t> med concurrency etc.</a:t>
+            </a:r>
+          </a:p>
+        </p:txBody>
+      </p:sp>
+      <p:sp>
+        <p:nvSpPr>
+          <p:cNvPr id="4" name="Slide Number Placeholder 3"/>
+          <p:cNvSpPr>
+            <a:spLocks noGrp="1"/>
+          </p:cNvSpPr>
+          <p:nvPr>
+            <p:ph type="sldNum" sz="quarter" idx="5"/>
+          </p:nvPr>
+        </p:nvSpPr>
+        <p:spPr/>
+        <p:txBody>
+          <a:bodyPr/>
+          <a:lstStyle/>
+          <a:p>
+            <a:fld id="{C6531923-F268-44F8-924B-792C0EE4DA95}" type="slidenum">
+              <a:rPr lang="en-SE" smtClean="0"/>
+              <a:t>14</a:t>
+            </a:fld>
+            <a:endParaRPr lang="en-SE"/>
+          </a:p>
+        </p:txBody>
+      </p:sp>
+    </p:spTree>
+    <p:extLst>
+      <p:ext uri="{BB962C8B-B14F-4D97-AF65-F5344CB8AC3E}">
+        <p14:creationId xmlns:p14="http://schemas.microsoft.com/office/powerpoint/2010/main" val="2872472188"/>
+      </p:ext>
+    </p:extLst>
+  </p:cSld>
+  <p:clrMapOvr>
+    <a:masterClrMapping/>
+  </p:clrMapOvr>
+</p:notes>
+</file>
+
+<file path=ppt/notesSlides/notesSlide9.xml><?xml version="1.0" encoding="utf-8"?>
+<p:notes xmlns:a="http://schemas.openxmlformats.org/drawingml/2006/main" xmlns:r="http://schemas.openxmlformats.org/officeDocument/2006/relationships" xmlns:p="http://schemas.openxmlformats.org/presentationml/2006/main">
+  <p:cSld>
+    <p:spTree>
+      <p:nvGrpSpPr>
+        <p:cNvPr id="1" name=""/>
+        <p:cNvGrpSpPr/>
+        <p:nvPr/>
+      </p:nvGrpSpPr>
+      <p:grpSpPr>
+        <a:xfrm>
+          <a:off x="0" y="0"/>
+          <a:ext cx="0" cy="0"/>
+          <a:chOff x="0" y="0"/>
+          <a:chExt cx="0" cy="0"/>
+        </a:xfrm>
+      </p:grpSpPr>
+      <p:sp>
+        <p:nvSpPr>
+          <p:cNvPr id="2" name="Slide Image Placeholder 1"/>
+          <p:cNvSpPr>
+            <a:spLocks noGrp="1" noRot="1" noChangeAspect="1"/>
+          </p:cNvSpPr>
+          <p:nvPr>
+            <p:ph type="sldImg"/>
+          </p:nvPr>
+        </p:nvSpPr>
+        <p:spPr/>
+      </p:sp>
+      <p:sp>
+        <p:nvSpPr>
+          <p:cNvPr id="3" name="Notes Placeholder 2"/>
+          <p:cNvSpPr>
+            <a:spLocks noGrp="1"/>
+          </p:cNvSpPr>
+          <p:nvPr>
+            <p:ph type="body" idx="1"/>
+          </p:nvPr>
+        </p:nvSpPr>
+        <p:spPr/>
+        <p:txBody>
+          <a:bodyPr/>
+          <a:lstStyle/>
+          <a:p>
+            <a:endParaRPr lang="en-SE" dirty="0"/>
+          </a:p>
+        </p:txBody>
+      </p:sp>
+      <p:sp>
+        <p:nvSpPr>
+          <p:cNvPr id="4" name="Slide Number Placeholder 3"/>
+          <p:cNvSpPr>
+            <a:spLocks noGrp="1"/>
+          </p:cNvSpPr>
+          <p:nvPr>
+            <p:ph type="sldNum" sz="quarter" idx="5"/>
+          </p:nvPr>
+        </p:nvSpPr>
+        <p:spPr/>
+        <p:txBody>
+          <a:bodyPr/>
+          <a:lstStyle/>
+          <a:p>
+            <a:fld id="{C6531923-F268-44F8-924B-792C0EE4DA95}" type="slidenum">
+              <a:rPr lang="en-SE" smtClean="0"/>
+              <a:t>15</a:t>
+            </a:fld>
+            <a:endParaRPr lang="en-SE"/>
+          </a:p>
+        </p:txBody>
+      </p:sp>
+    </p:spTree>
+    <p:extLst>
+      <p:ext uri="{BB962C8B-B14F-4D97-AF65-F5344CB8AC3E}">
+        <p14:creationId xmlns:p14="http://schemas.microsoft.com/office/powerpoint/2010/main" val="2609064441"/>
+      </p:ext>
+    </p:extLst>
+  </p:cSld>
+  <p:clrMapOvr>
+    <a:masterClrMapping/>
+  </p:clrMapOvr>
+</p:notes>
 </file>
 
 <file path=ppt/slideLayouts/slideLayout1.xml><?xml version="1.0" encoding="utf-8"?>
@@ -7739,7 +9468,7 @@
           <p:nvPr/>
         </p:nvPicPr>
         <p:blipFill>
-          <a:blip r:embed="rId2">
+          <a:blip r:embed="rId3">
             <a:extLst>
               <a:ext uri="{28A0092B-C50C-407E-A947-70E740481C1C}">
                 <a14:useLocalDpi xmlns:a14="http://schemas.microsoft.com/office/drawing/2010/main" val="0"/>
@@ -7786,7 +9515,7 @@
           <p:nvPr/>
         </p:nvPicPr>
         <p:blipFill>
-          <a:blip r:embed="rId3"/>
+          <a:blip r:embed="rId4"/>
           <a:stretch>
             <a:fillRect/>
           </a:stretch>
@@ -8055,7 +9784,7 @@
           <a:p>
             <a:r>
               <a:rPr lang="en-US" sz="900" dirty="0">
-                <a:hlinkClick r:id="rId4"/>
+                <a:hlinkClick r:id="rId5"/>
               </a:rPr>
               <a:t>https://docs.microsoft.com/en-us/azure/azure-functions/durable/durable-functions-overview#fan-in-out</a:t>
             </a:r>
@@ -8167,7 +9896,7 @@
           <p:nvPr/>
         </p:nvPicPr>
         <p:blipFill>
-          <a:blip r:embed="rId2">
+          <a:blip r:embed="rId3">
             <a:extLst>
               <a:ext uri="{28A0092B-C50C-407E-A947-70E740481C1C}">
                 <a14:useLocalDpi xmlns:a14="http://schemas.microsoft.com/office/drawing/2010/main" val="0"/>
@@ -8448,7 +10177,7 @@
           <a:p>
             <a:r>
               <a:rPr lang="en-US" sz="900" dirty="0">
-                <a:hlinkClick r:id="rId3"/>
+                <a:hlinkClick r:id="rId4"/>
               </a:rPr>
               <a:t>https://docs.microsoft.com/en-us/azure/azure-functions/durable/durable-functions-overview#async-http</a:t>
             </a:r>
@@ -8552,7 +10281,7 @@
           <p:nvPr/>
         </p:nvPicPr>
         <p:blipFill>
-          <a:blip r:embed="rId2">
+          <a:blip r:embed="rId3">
             <a:extLst>
               <a:ext uri="{28A0092B-C50C-407E-A947-70E740481C1C}">
                 <a14:useLocalDpi xmlns:a14="http://schemas.microsoft.com/office/drawing/2010/main" val="0"/>
@@ -8599,7 +10328,7 @@
           <p:nvPr/>
         </p:nvPicPr>
         <p:blipFill>
-          <a:blip r:embed="rId3"/>
+          <a:blip r:embed="rId4"/>
           <a:stretch>
             <a:fillRect/>
           </a:stretch>
@@ -8868,7 +10597,7 @@
           <a:p>
             <a:r>
               <a:rPr lang="en-US" sz="900" dirty="0">
-                <a:hlinkClick r:id="rId4"/>
+                <a:hlinkClick r:id="rId5"/>
               </a:rPr>
               <a:t>https://docs.microsoft.com/en-us/azure/azure-functions/durable/durable-functions-overview#monitoring</a:t>
             </a:r>
@@ -9206,7 +10935,7 @@
           <a:p>
             <a:r>
               <a:rPr lang="en-US" sz="900" dirty="0">
-                <a:hlinkClick r:id="rId2"/>
+                <a:hlinkClick r:id="rId3"/>
               </a:rPr>
               <a:t>https://docs.microsoft.com/en-us/azure/azure-functions/durable/durable-functions-overview#monitoring</a:t>
             </a:r>
@@ -9233,7 +10962,7 @@
           <p:nvPr/>
         </p:nvPicPr>
         <p:blipFill>
-          <a:blip r:embed="rId3">
+          <a:blip r:embed="rId4">
             <a:extLst>
               <a:ext uri="{28A0092B-C50C-407E-A947-70E740481C1C}">
                 <a14:useLocalDpi xmlns:a14="http://schemas.microsoft.com/office/drawing/2010/main" val="0"/>
@@ -9280,7 +11009,7 @@
           <p:nvPr/>
         </p:nvPicPr>
         <p:blipFill>
-          <a:blip r:embed="rId4"/>
+          <a:blip r:embed="rId5"/>
           <a:stretch>
             <a:fillRect/>
           </a:stretch>
@@ -9626,13 +11355,25 @@
           <a:p>
             <a:r>
               <a:rPr lang="en-US" sz="900" dirty="0">
-                <a:hlinkClick r:id="rId2"/>
+                <a:hlinkClick r:id="rId3"/>
               </a:rPr>
-              <a:t>https://docs.microsoft.com/en-us/azure/azure-functions/durable/durable-functions-overview#monitoring</a:t>
+              <a:t>https://docs.microsoft.com/en-us/azure/azure-functions/durable/durable-functions-overview</a:t>
+            </a:r>
+            <a:r>
+              <a:rPr lang="en-SE" sz="900" dirty="0">
+                <a:hlinkClick r:id="rId3"/>
+              </a:rPr>
+              <a:t>#</a:t>
+            </a:r>
+            <a:r>
+              <a:rPr lang="en-US" sz="900" dirty="0">
+                <a:hlinkClick r:id="rId3"/>
+              </a:rPr>
+              <a:t>aggregator</a:t>
             </a:r>
             <a:r>
               <a:rPr lang="en-SE" sz="900" dirty="0"/>
-              <a:t> </a:t>
+              <a:t>  </a:t>
             </a:r>
             <a:endParaRPr lang="en-US" sz="900" dirty="0"/>
           </a:p>
@@ -9653,7 +11394,7 @@
           <p:nvPr/>
         </p:nvPicPr>
         <p:blipFill>
-          <a:blip r:embed="rId3">
+          <a:blip r:embed="rId4">
             <a:extLst>
               <a:ext uri="{28A0092B-C50C-407E-A947-70E740481C1C}">
                 <a14:useLocalDpi xmlns:a14="http://schemas.microsoft.com/office/drawing/2010/main" val="0"/>
@@ -9700,7 +11441,7 @@
           <p:nvPr/>
         </p:nvPicPr>
         <p:blipFill>
-          <a:blip r:embed="rId4"/>
+          <a:blip r:embed="rId5"/>
           <a:stretch>
             <a:fillRect/>
           </a:stretch>
@@ -9736,7 +11477,7 @@
           <p:nvPr/>
         </p:nvPicPr>
         <p:blipFill>
-          <a:blip r:embed="rId5"/>
+          <a:blip r:embed="rId6"/>
           <a:stretch>
             <a:fillRect/>
           </a:stretch>
@@ -9854,7 +11595,7 @@
           <p:nvPr/>
         </p:nvPicPr>
         <p:blipFill>
-          <a:blip r:embed="rId6"/>
+          <a:blip r:embed="rId7"/>
           <a:stretch>
             <a:fillRect/>
           </a:stretch>
@@ -12441,13 +14182,13 @@
   <p:clrMapOvr>
     <a:masterClrMapping/>
   </p:clrMapOvr>
-  <mc:AlternateContent xmlns:mc="http://schemas.openxmlformats.org/markup-compatibility/2006">
-    <mc:Choice xmlns:p14="http://schemas.microsoft.com/office/powerpoint/2010/main" Requires="p14">
+  <mc:AlternateContent xmlns:mc="http://schemas.openxmlformats.org/markup-compatibility/2006" xmlns:p14="http://schemas.microsoft.com/office/powerpoint/2010/main">
+    <mc:Choice Requires="p14">
       <p:transition spd="med" p14:dur="700">
         <p:fade/>
       </p:transition>
     </mc:Choice>
-    <mc:Fallback>
+    <mc:Fallback xmlns="">
       <p:transition spd="med">
         <p:fade/>
       </p:transition>
@@ -13898,13 +15639,13 @@
           </p:nvPr>
         </p:nvPicPr>
         <p:blipFill rotWithShape="1">
-          <a:blip r:embed="rId2">
+          <a:blip r:embed="rId3">
             <a:extLst>
               <a:ext uri="{28A0092B-C50C-407E-A947-70E740481C1C}">
                 <a14:useLocalDpi xmlns:a14="http://schemas.microsoft.com/office/drawing/2010/main" val="0"/>
               </a:ext>
               <a:ext uri="{96DAC541-7B7A-43D3-8B79-37D633B846F1}">
-                <asvg:svgBlip xmlns:asvg="http://schemas.microsoft.com/office/drawing/2016/SVG/main" r:embed="rId3"/>
+                <asvg:svgBlip xmlns:asvg="http://schemas.microsoft.com/office/drawing/2016/SVG/main" r:embed="rId4"/>
               </a:ext>
             </a:extLst>
           </a:blip>
@@ -14294,25 +16035,25 @@
           <a:p>
             <a:r>
               <a:rPr lang="en-US" sz="900" dirty="0">
-                <a:hlinkClick r:id="rId4"/>
+                <a:hlinkClick r:id="rId5"/>
               </a:rPr>
               <a:t>https://docs.microsoft.com/</a:t>
             </a:r>
             <a:r>
               <a:rPr lang="en-SE" sz="900" dirty="0" err="1">
-                <a:hlinkClick r:id="rId4"/>
+                <a:hlinkClick r:id="rId5"/>
               </a:rPr>
               <a:t>en</a:t>
             </a:r>
             <a:r>
               <a:rPr lang="en-SE" sz="900" dirty="0">
-                <a:hlinkClick r:id="rId4"/>
+                <a:hlinkClick r:id="rId5"/>
               </a:rPr>
               <a:t>-us</a:t>
             </a:r>
             <a:r>
               <a:rPr lang="en-US" sz="900" dirty="0">
-                <a:hlinkClick r:id="rId4"/>
+                <a:hlinkClick r:id="rId5"/>
               </a:rPr>
               <a:t>/azure/azure-functions/functions-scale</a:t>
             </a:r>
@@ -14416,13 +16157,13 @@
           </p:nvPr>
         </p:nvPicPr>
         <p:blipFill rotWithShape="1">
-          <a:blip r:embed="rId2">
+          <a:blip r:embed="rId3">
             <a:extLst>
               <a:ext uri="{28A0092B-C50C-407E-A947-70E740481C1C}">
                 <a14:useLocalDpi xmlns:a14="http://schemas.microsoft.com/office/drawing/2010/main" val="0"/>
               </a:ext>
               <a:ext uri="{96DAC541-7B7A-43D3-8B79-37D633B846F1}">
-                <asvg:svgBlip xmlns:asvg="http://schemas.microsoft.com/office/drawing/2016/SVG/main" r:embed="rId3"/>
+                <asvg:svgBlip xmlns:asvg="http://schemas.microsoft.com/office/drawing/2016/SVG/main" r:embed="rId4"/>
               </a:ext>
             </a:extLst>
           </a:blip>
@@ -14794,25 +16535,25 @@
           <a:p>
             <a:r>
               <a:rPr lang="en-US" sz="900" dirty="0">
-                <a:hlinkClick r:id="rId4"/>
+                <a:hlinkClick r:id="rId5"/>
               </a:rPr>
               <a:t>https://docs.microsoft.com/</a:t>
             </a:r>
             <a:r>
               <a:rPr lang="en-SE" sz="900" dirty="0" err="1">
-                <a:hlinkClick r:id="rId4"/>
+                <a:hlinkClick r:id="rId5"/>
               </a:rPr>
               <a:t>en</a:t>
             </a:r>
             <a:r>
               <a:rPr lang="en-SE" sz="900" dirty="0">
-                <a:hlinkClick r:id="rId4"/>
+                <a:hlinkClick r:id="rId5"/>
               </a:rPr>
               <a:t>-us</a:t>
             </a:r>
             <a:r>
               <a:rPr lang="en-US" sz="900" dirty="0">
-                <a:hlinkClick r:id="rId4"/>
+                <a:hlinkClick r:id="rId5"/>
               </a:rPr>
               <a:t>/azure/azure-functions/functions-triggers-bindings?supported-bindings</a:t>
             </a:r>
@@ -15018,25 +16759,25 @@
           <a:p>
             <a:r>
               <a:rPr lang="en-US" sz="900" dirty="0">
-                <a:hlinkClick r:id="rId5"/>
+                <a:hlinkClick r:id="rId6"/>
               </a:rPr>
               <a:t>https://docs.microsoft.com/</a:t>
             </a:r>
             <a:r>
               <a:rPr lang="en-SE" sz="900" dirty="0" err="1">
-                <a:hlinkClick r:id="rId5"/>
+                <a:hlinkClick r:id="rId6"/>
               </a:rPr>
               <a:t>en</a:t>
             </a:r>
             <a:r>
               <a:rPr lang="en-SE" sz="900" dirty="0">
-                <a:hlinkClick r:id="rId5"/>
+                <a:hlinkClick r:id="rId6"/>
               </a:rPr>
               <a:t>-us</a:t>
             </a:r>
             <a:r>
               <a:rPr lang="en-US" sz="900" dirty="0">
-                <a:hlinkClick r:id="rId5"/>
+                <a:hlinkClick r:id="rId6"/>
               </a:rPr>
               <a:t>/azure/azure-functions/functions-bindings-example</a:t>
             </a:r>
@@ -16195,7 +17936,7 @@
           <p:nvPr/>
         </p:nvPicPr>
         <p:blipFill>
-          <a:blip r:embed="rId2">
+          <a:blip r:embed="rId3">
             <a:extLst>
               <a:ext uri="{28A0092B-C50C-407E-A947-70E740481C1C}">
                 <a14:useLocalDpi xmlns:a14="http://schemas.microsoft.com/office/drawing/2010/main" val="0"/>
@@ -16277,7 +18018,7 @@
           <p:nvPr/>
         </p:nvPicPr>
         <p:blipFill>
-          <a:blip r:embed="rId3"/>
+          <a:blip r:embed="rId4"/>
           <a:stretch>
             <a:fillRect/>
           </a:stretch>
@@ -16546,7 +18287,7 @@
           <a:p>
             <a:r>
               <a:rPr lang="en-US" sz="900" dirty="0">
-                <a:hlinkClick r:id="rId4"/>
+                <a:hlinkClick r:id="rId5"/>
               </a:rPr>
               <a:t>https://docs.microsoft.com/en-us/azure/azure-functions/durable/durable-functions-overview#chaining</a:t>
             </a:r>
@@ -16670,7 +18411,7 @@
               </a:r>
               <a:r>
                 <a:rPr lang="sv-SE" sz="1100" dirty="0">
-                  <a:hlinkClick r:id="rId5"/>
+                  <a:hlinkClick r:id="rId6"/>
                 </a:rPr>
                 <a:t>Durable Functions Monitor</a:t>
               </a:r>
@@ -17336,6 +19077,14 @@
 </file>
 
 <file path=customXml/item1.xml><?xml version="1.0" encoding="utf-8"?>
+<p:properties xmlns:p="http://schemas.microsoft.com/office/2006/metadata/properties" xmlns:xsi="http://www.w3.org/2001/XMLSchema-instance" xmlns:pc="http://schemas.microsoft.com/office/infopath/2007/PartnerControls">
+  <documentManagement>
+    <Dokumenttyp xmlns="79989873-1933-4030-a5af-9c9ae85f1deb" xsi:nil="true"/>
+  </documentManagement>
+</p:properties>
+</file>
+
+<file path=customXml/item2.xml><?xml version="1.0" encoding="utf-8"?>
 <ct:contentTypeSchema xmlns:ct="http://schemas.microsoft.com/office/2006/metadata/contentType" xmlns:ma="http://schemas.microsoft.com/office/2006/metadata/properties/metaAttributes" ct:_="" ma:_="" ma:contentTypeName="dokument" ma:contentTypeID="0x010100350D11E526B8AC4F9BA28E57CD1B7A9D" ma:contentTypeVersion="11" ma:contentTypeDescription="Skapa ett nytt dokument." ma:contentTypeScope="" ma:versionID="0230ae9714afd621f6f3a1cff396ffc0">
   <xsd:schema xmlns:xsd="http://www.w3.org/2001/XMLSchema" xmlns:xs="http://www.w3.org/2001/XMLSchema" xmlns:p="http://schemas.microsoft.com/office/2006/metadata/properties" xmlns:ns2="79989873-1933-4030-a5af-9c9ae85f1deb" xmlns:ns3="3b7be02a-60f8-4b25-a7d7-f512eecf9bec" targetNamespace="http://schemas.microsoft.com/office/2006/metadata/properties" ma:root="true" ma:fieldsID="58e2b436a9445bd6233da9647bf7a676" ns2:_="" ns3:_="">
     <xsd:import namespace="79989873-1933-4030-a5af-9c9ae85f1deb"/>
@@ -17546,14 +19295,6 @@
 </ct:contentTypeSchema>
 </file>
 
-<file path=customXml/item2.xml><?xml version="1.0" encoding="utf-8"?>
-<p:properties xmlns:p="http://schemas.microsoft.com/office/2006/metadata/properties" xmlns:xsi="http://www.w3.org/2001/XMLSchema-instance" xmlns:pc="http://schemas.microsoft.com/office/infopath/2007/PartnerControls">
-  <documentManagement>
-    <Dokumenttyp xmlns="79989873-1933-4030-a5af-9c9ae85f1deb" xsi:nil="true"/>
-  </documentManagement>
-</p:properties>
-</file>
-
 <file path=customXml/item3.xml><?xml version="1.0" encoding="utf-8"?>
 <?mso-contentType ?>
 <FormTemplates xmlns="http://schemas.microsoft.com/sharepoint/v3/contenttype/forms">
@@ -17564,6 +19305,16 @@
 </file>
 
 <file path=customXml/itemProps1.xml><?xml version="1.0" encoding="utf-8"?>
+<ds:datastoreItem xmlns:ds="http://schemas.openxmlformats.org/officeDocument/2006/customXml" ds:itemID="{CA595190-91DC-4C55-8CBC-4A7F4E0D64AA}">
+  <ds:schemaRefs>
+    <ds:schemaRef ds:uri="http://schemas.microsoft.com/office/2006/metadata/properties"/>
+    <ds:schemaRef ds:uri="http://schemas.microsoft.com/office/infopath/2007/PartnerControls"/>
+    <ds:schemaRef ds:uri="79989873-1933-4030-a5af-9c9ae85f1deb"/>
+  </ds:schemaRefs>
+</ds:datastoreItem>
+</file>
+
+<file path=customXml/itemProps2.xml><?xml version="1.0" encoding="utf-8"?>
 <ds:datastoreItem xmlns:ds="http://schemas.openxmlformats.org/officeDocument/2006/customXml" ds:itemID="{2269FB51-990C-4090-83AF-796D8B78C721}">
   <ds:schemaRefs>
     <ds:schemaRef ds:uri="http://schemas.microsoft.com/office/2006/metadata/contentType"/>
@@ -17582,16 +19333,6 @@
 </ds:datastoreItem>
 </file>
 
-<file path=customXml/itemProps2.xml><?xml version="1.0" encoding="utf-8"?>
-<ds:datastoreItem xmlns:ds="http://schemas.openxmlformats.org/officeDocument/2006/customXml" ds:itemID="{CA595190-91DC-4C55-8CBC-4A7F4E0D64AA}">
-  <ds:schemaRefs>
-    <ds:schemaRef ds:uri="http://schemas.microsoft.com/office/2006/metadata/properties"/>
-    <ds:schemaRef ds:uri="http://schemas.microsoft.com/office/infopath/2007/PartnerControls"/>
-    <ds:schemaRef ds:uri="79989873-1933-4030-a5af-9c9ae85f1deb"/>
-  </ds:schemaRefs>
-</ds:datastoreItem>
-</file>
-
 <file path=customXml/itemProps3.xml><?xml version="1.0" encoding="utf-8"?>
 <ds:datastoreItem xmlns:ds="http://schemas.openxmlformats.org/officeDocument/2006/customXml" ds:itemID="{7E1975E0-3006-4B25-93FF-9F474E8CC29B}">
   <ds:schemaRefs>

</xml_diff>

<commit_message>
Add link to repo, code & pptx
</commit_message>
<xml_diff>
--- a/Az durable functions.pptx
+++ b/Az durable functions.pptx
@@ -231,7 +231,7 @@
           <a:p>
             <a:fld id="{DBA7FB41-DEA9-4563-84B2-37E0583EFC49}" type="datetimeFigureOut">
               <a:rPr lang="en-SE" smtClean="0"/>
-              <a:t>2021-04-06</a:t>
+              <a:t>2021-04-07</a:t>
             </a:fld>
             <a:endParaRPr lang="en-SE"/>
           </a:p>
@@ -543,133 +543,7 @@
           <a:bodyPr/>
           <a:lstStyle/>
           <a:p>
-            <a:r>
-              <a:rPr lang="en-SE" dirty="0" err="1"/>
-              <a:t>Språk</a:t>
-            </a:r>
-            <a:r>
-              <a:rPr lang="en-SE" dirty="0"/>
-              <a:t>: </a:t>
-            </a:r>
-          </a:p>
-          <a:p>
-            <a:r>
-              <a:rPr lang="en-SE" dirty="0"/>
-              <a:t>C#, Java, JS (</a:t>
-            </a:r>
-            <a:r>
-              <a:rPr lang="en-SE" dirty="0" err="1"/>
-              <a:t>nodejs</a:t>
-            </a:r>
-            <a:r>
-              <a:rPr lang="en-SE" dirty="0"/>
-              <a:t>, typescript), Ps, Python</a:t>
-            </a:r>
-          </a:p>
-          <a:p>
             <a:endParaRPr lang="en-SE" dirty="0"/>
-          </a:p>
-          <a:p>
-            <a:r>
-              <a:rPr lang="en-SE" dirty="0"/>
-              <a:t>Custom handler ger </a:t>
-            </a:r>
-            <a:r>
-              <a:rPr lang="en-SE" dirty="0" err="1"/>
-              <a:t>stöd</a:t>
-            </a:r>
-            <a:r>
-              <a:rPr lang="en-SE" dirty="0"/>
-              <a:t> </a:t>
-            </a:r>
-            <a:r>
-              <a:rPr lang="en-SE" dirty="0" err="1"/>
-              <a:t>för</a:t>
-            </a:r>
-            <a:r>
-              <a:rPr lang="en-SE" dirty="0"/>
-              <a:t> </a:t>
-            </a:r>
-            <a:r>
-              <a:rPr lang="en-SE" dirty="0" err="1"/>
-              <a:t>nästan</a:t>
-            </a:r>
-            <a:r>
-              <a:rPr lang="en-SE" dirty="0"/>
-              <a:t> </a:t>
-            </a:r>
-            <a:r>
-              <a:rPr lang="en-SE" dirty="0" err="1"/>
-              <a:t>vilket</a:t>
-            </a:r>
-            <a:r>
-              <a:rPr lang="en-SE" dirty="0"/>
-              <a:t> </a:t>
-            </a:r>
-            <a:r>
-              <a:rPr lang="en-SE" dirty="0" err="1"/>
-              <a:t>språk</a:t>
-            </a:r>
-            <a:r>
-              <a:rPr lang="en-SE" dirty="0"/>
-              <a:t> </a:t>
-            </a:r>
-            <a:r>
-              <a:rPr lang="en-SE" dirty="0" err="1"/>
-              <a:t>som</a:t>
-            </a:r>
-            <a:r>
-              <a:rPr lang="en-SE" dirty="0"/>
-              <a:t> </a:t>
-            </a:r>
-            <a:r>
-              <a:rPr lang="en-SE" dirty="0" err="1"/>
-              <a:t>helst</a:t>
-            </a:r>
-            <a:r>
-              <a:rPr lang="en-SE" dirty="0"/>
-              <a:t>, </a:t>
-            </a:r>
-            <a:r>
-              <a:rPr lang="en-SE" dirty="0" err="1"/>
-              <a:t>där</a:t>
-            </a:r>
-            <a:r>
-              <a:rPr lang="en-SE" dirty="0"/>
-              <a:t> det </a:t>
-            </a:r>
-            <a:r>
-              <a:rPr lang="en-SE" dirty="0" err="1"/>
-              <a:t>finns</a:t>
-            </a:r>
-            <a:r>
-              <a:rPr lang="en-SE" dirty="0"/>
-              <a:t> bra </a:t>
-            </a:r>
-            <a:r>
-              <a:rPr lang="en-SE" dirty="0" err="1"/>
-              <a:t>dokumentation</a:t>
-            </a:r>
-            <a:r>
-              <a:rPr lang="en-SE" dirty="0"/>
-              <a:t> </a:t>
-            </a:r>
-            <a:r>
-              <a:rPr lang="en-SE" dirty="0" err="1"/>
-              <a:t>för</a:t>
-            </a:r>
-            <a:r>
-              <a:rPr lang="en-SE" dirty="0"/>
-              <a:t> Go </a:t>
-            </a:r>
-            <a:r>
-              <a:rPr lang="en-SE" dirty="0" err="1"/>
-              <a:t>och</a:t>
-            </a:r>
-            <a:r>
-              <a:rPr lang="en-SE" dirty="0"/>
-              <a:t> Rust.</a:t>
-            </a:r>
           </a:p>
         </p:txBody>
       </p:sp>
@@ -753,122 +627,6 @@
           <a:bodyPr/>
           <a:lstStyle/>
           <a:p>
-            <a:r>
-              <a:rPr lang="en-SE" dirty="0"/>
-              <a:t>Visa </a:t>
-            </a:r>
-            <a:r>
-              <a:rPr lang="en-SE" dirty="0" err="1"/>
-              <a:t>olika</a:t>
-            </a:r>
-            <a:r>
-              <a:rPr lang="en-SE" dirty="0"/>
-              <a:t> </a:t>
-            </a:r>
-            <a:r>
-              <a:rPr lang="en-SE" dirty="0" err="1"/>
-              <a:t>typer</a:t>
-            </a:r>
-            <a:r>
-              <a:rPr lang="en-SE" dirty="0"/>
-              <a:t> av triggers </a:t>
-            </a:r>
-            <a:r>
-              <a:rPr lang="en-SE" dirty="0" err="1"/>
-              <a:t>och</a:t>
-            </a:r>
-            <a:r>
-              <a:rPr lang="en-SE" dirty="0"/>
-              <a:t> bindings.</a:t>
-            </a:r>
-          </a:p>
-          <a:p>
-            <a:endParaRPr lang="en-SE" dirty="0"/>
-          </a:p>
-          <a:p>
-            <a:r>
-              <a:rPr lang="en-SE" dirty="0"/>
-              <a:t>Visa model bindings: Lite </a:t>
-            </a:r>
-            <a:r>
-              <a:rPr lang="en-SE" dirty="0" err="1"/>
-              <a:t>hemlig</a:t>
-            </a:r>
-            <a:r>
-              <a:rPr lang="en-SE" dirty="0"/>
-              <a:t> feature </a:t>
-            </a:r>
-            <a:r>
-              <a:rPr lang="en-SE" dirty="0" err="1"/>
-              <a:t>tycker</a:t>
-            </a:r>
-            <a:r>
-              <a:rPr lang="en-SE" dirty="0"/>
-              <a:t> jag, men om man </a:t>
-            </a:r>
-            <a:r>
-              <a:rPr lang="en-SE" dirty="0" err="1"/>
-              <a:t>är</a:t>
-            </a:r>
-            <a:r>
-              <a:rPr lang="en-SE" dirty="0"/>
-              <a:t> van vid asp.net </a:t>
-            </a:r>
-            <a:r>
-              <a:rPr lang="en-SE" dirty="0" err="1"/>
-              <a:t>mvc</a:t>
-            </a:r>
-            <a:r>
-              <a:rPr lang="en-SE" dirty="0"/>
-              <a:t> (core) </a:t>
-            </a:r>
-            <a:r>
-              <a:rPr lang="en-SE" dirty="0" err="1"/>
-              <a:t>och</a:t>
-            </a:r>
-            <a:r>
-              <a:rPr lang="en-SE" dirty="0"/>
-              <a:t> </a:t>
-            </a:r>
-            <a:r>
-              <a:rPr lang="en-SE" dirty="0" err="1"/>
-              <a:t>dess</a:t>
-            </a:r>
-            <a:r>
-              <a:rPr lang="en-SE" dirty="0"/>
-              <a:t> model binding </a:t>
-            </a:r>
-            <a:r>
-              <a:rPr lang="en-SE" dirty="0" err="1"/>
-              <a:t>så</a:t>
-            </a:r>
-            <a:r>
-              <a:rPr lang="en-SE" dirty="0"/>
-              <a:t> </a:t>
-            </a:r>
-            <a:r>
-              <a:rPr lang="en-SE" dirty="0" err="1"/>
-              <a:t>är</a:t>
-            </a:r>
-            <a:r>
-              <a:rPr lang="en-SE" dirty="0"/>
-              <a:t> det fin </a:t>
-            </a:r>
-            <a:r>
-              <a:rPr lang="en-SE" dirty="0" err="1"/>
-              <a:t>att</a:t>
-            </a:r>
-            <a:r>
-              <a:rPr lang="en-SE" dirty="0"/>
-              <a:t> </a:t>
-            </a:r>
-            <a:r>
-              <a:rPr lang="en-SE" dirty="0" err="1"/>
-              <a:t>kunna</a:t>
-            </a:r>
-            <a:endParaRPr lang="en-SE" dirty="0"/>
-          </a:p>
-          <a:p>
             <a:endParaRPr lang="en-SE" dirty="0"/>
           </a:p>
         </p:txBody>
@@ -953,110 +711,7 @@
           <a:bodyPr/>
           <a:lstStyle/>
           <a:p>
-            <a:r>
-              <a:rPr lang="en-SE" dirty="0"/>
-              <a:t>Use case: Inom </a:t>
-            </a:r>
-            <a:r>
-              <a:rPr lang="en-SE" dirty="0" err="1"/>
-              <a:t>samma</a:t>
-            </a:r>
-            <a:r>
-              <a:rPr lang="en-SE" dirty="0"/>
-              <a:t> function app, </a:t>
-            </a:r>
-            <a:r>
-              <a:rPr lang="en-SE" dirty="0" err="1"/>
-              <a:t>kör</a:t>
-            </a:r>
-            <a:r>
-              <a:rPr lang="en-SE" dirty="0"/>
-              <a:t> functions </a:t>
-            </a:r>
-            <a:r>
-              <a:rPr lang="en-SE" dirty="0" err="1"/>
-              <a:t>i</a:t>
-            </a:r>
-            <a:r>
-              <a:rPr lang="en-SE" dirty="0"/>
-              <a:t> </a:t>
-            </a:r>
-            <a:r>
-              <a:rPr lang="en-SE" dirty="0" err="1"/>
-              <a:t>specifik</a:t>
-            </a:r>
-            <a:r>
-              <a:rPr lang="en-SE" dirty="0"/>
-              <a:t> </a:t>
-            </a:r>
-            <a:r>
-              <a:rPr lang="en-SE" dirty="0" err="1"/>
-              <a:t>ordning</a:t>
-            </a:r>
-            <a:r>
-              <a:rPr lang="en-SE" dirty="0"/>
-              <a:t> </a:t>
-            </a:r>
-            <a:r>
-              <a:rPr lang="en-SE" dirty="0" err="1"/>
-              <a:t>där</a:t>
-            </a:r>
-            <a:r>
-              <a:rPr lang="en-SE" dirty="0"/>
-              <a:t> input till </a:t>
-            </a:r>
-            <a:r>
-              <a:rPr lang="en-SE" dirty="0" err="1"/>
-              <a:t>en</a:t>
-            </a:r>
-            <a:r>
-              <a:rPr lang="en-SE" dirty="0"/>
-              <a:t> fun</a:t>
-            </a:r>
-            <a:r>
-              <a:rPr lang="sv-SE" dirty="0"/>
-              <a:t>c</a:t>
-            </a:r>
-            <a:r>
-              <a:rPr lang="en-SE" dirty="0" err="1"/>
-              <a:t>tion</a:t>
-            </a:r>
-            <a:r>
-              <a:rPr lang="en-SE" dirty="0"/>
-              <a:t> </a:t>
-            </a:r>
-            <a:r>
-              <a:rPr lang="en-SE" dirty="0" err="1"/>
-              <a:t>är</a:t>
-            </a:r>
-            <a:r>
-              <a:rPr lang="en-SE" dirty="0"/>
-              <a:t> </a:t>
-            </a:r>
-            <a:r>
-              <a:rPr lang="en-SE" dirty="0" err="1"/>
-              <a:t>från</a:t>
-            </a:r>
-            <a:r>
-              <a:rPr lang="en-SE" dirty="0"/>
-              <a:t> output av </a:t>
-            </a:r>
-            <a:r>
-              <a:rPr lang="en-SE" dirty="0" err="1"/>
-              <a:t>en</a:t>
-            </a:r>
-            <a:r>
-              <a:rPr lang="en-SE" dirty="0"/>
-              <a:t> </a:t>
-            </a:r>
-            <a:r>
-              <a:rPr lang="en-SE" dirty="0" err="1"/>
-              <a:t>annan</a:t>
-            </a:r>
-            <a:r>
-              <a:rPr lang="en-SE" dirty="0"/>
-              <a:t>.</a:t>
-            </a:r>
+            <a:endParaRPr lang="en-SE" dirty="0"/>
           </a:p>
         </p:txBody>
       </p:sp>
@@ -1140,218 +795,7 @@
           <a:bodyPr/>
           <a:lstStyle/>
           <a:p>
-            <a:r>
-              <a:rPr lang="en-SE" dirty="0"/>
-              <a:t>Use case: </a:t>
-            </a:r>
-            <a:r>
-              <a:rPr lang="en-SE" dirty="0" err="1"/>
-              <a:t>Ersätter</a:t>
-            </a:r>
-            <a:r>
-              <a:rPr lang="en-SE" dirty="0"/>
-              <a:t> </a:t>
-            </a:r>
-            <a:r>
-              <a:rPr lang="en-SE" dirty="0" err="1"/>
-              <a:t>systemdesignen</a:t>
-            </a:r>
-            <a:r>
-              <a:rPr lang="en-SE" dirty="0"/>
-              <a:t> </a:t>
-            </a:r>
-            <a:r>
-              <a:rPr lang="en-SE" dirty="0" err="1"/>
-              <a:t>att</a:t>
-            </a:r>
-            <a:r>
-              <a:rPr lang="en-SE" dirty="0"/>
-              <a:t> </a:t>
-            </a:r>
-            <a:r>
-              <a:rPr lang="en-SE" dirty="0" err="1"/>
-              <a:t>skicka</a:t>
-            </a:r>
-            <a:r>
-              <a:rPr lang="en-SE" dirty="0"/>
-              <a:t> </a:t>
-            </a:r>
-            <a:r>
-              <a:rPr lang="en-SE" dirty="0" err="1"/>
-              <a:t>multipla</a:t>
-            </a:r>
-            <a:r>
-              <a:rPr lang="en-SE" dirty="0"/>
-              <a:t> </a:t>
-            </a:r>
-            <a:r>
-              <a:rPr lang="en-SE" dirty="0" err="1"/>
-              <a:t>meddelanden</a:t>
-            </a:r>
-            <a:r>
-              <a:rPr lang="en-SE" dirty="0"/>
-              <a:t> till </a:t>
-            </a:r>
-            <a:r>
-              <a:rPr lang="en-SE" dirty="0" err="1"/>
-              <a:t>en</a:t>
-            </a:r>
-            <a:r>
-              <a:rPr lang="en-SE" dirty="0"/>
-              <a:t> </a:t>
-            </a:r>
-            <a:r>
-              <a:rPr lang="en-SE" dirty="0" err="1"/>
-              <a:t>kö</a:t>
-            </a:r>
-            <a:r>
-              <a:rPr lang="en-SE" dirty="0"/>
-              <a:t>, </a:t>
-            </a:r>
-            <a:r>
-              <a:rPr lang="en-SE" dirty="0" err="1"/>
-              <a:t>låta</a:t>
-            </a:r>
-            <a:r>
-              <a:rPr lang="en-SE" dirty="0"/>
-              <a:t> den betas av </a:t>
-            </a:r>
-            <a:r>
-              <a:rPr lang="en-SE" dirty="0" err="1"/>
-              <a:t>av</a:t>
-            </a:r>
-            <a:r>
-              <a:rPr lang="en-SE" dirty="0"/>
-              <a:t> </a:t>
-            </a:r>
-            <a:r>
-              <a:rPr lang="en-SE" dirty="0" err="1"/>
-              <a:t>flera</a:t>
-            </a:r>
-            <a:r>
-              <a:rPr lang="en-SE" dirty="0"/>
-              <a:t> </a:t>
-            </a:r>
-            <a:r>
-              <a:rPr lang="en-SE" dirty="0" err="1"/>
-              <a:t>instanser</a:t>
-            </a:r>
-            <a:r>
-              <a:rPr lang="en-SE" dirty="0"/>
-              <a:t> av </a:t>
-            </a:r>
-            <a:r>
-              <a:rPr lang="en-SE" dirty="0" err="1"/>
-              <a:t>en</a:t>
-            </a:r>
-            <a:r>
-              <a:rPr lang="en-SE" dirty="0"/>
-              <a:t> </a:t>
-            </a:r>
-            <a:r>
-              <a:rPr lang="en-SE" dirty="0" err="1"/>
-              <a:t>funktion</a:t>
-            </a:r>
-            <a:r>
-              <a:rPr lang="en-SE" dirty="0"/>
-              <a:t> </a:t>
-            </a:r>
-            <a:r>
-              <a:rPr lang="en-SE" dirty="0" err="1"/>
-              <a:t>och</a:t>
-            </a:r>
-            <a:r>
-              <a:rPr lang="en-SE" dirty="0"/>
-              <a:t> </a:t>
-            </a:r>
-            <a:r>
-              <a:rPr lang="en-SE" dirty="0" err="1"/>
-              <a:t>sen</a:t>
-            </a:r>
-            <a:r>
-              <a:rPr lang="en-SE" dirty="0"/>
-              <a:t> </a:t>
-            </a:r>
-            <a:r>
-              <a:rPr lang="en-SE" dirty="0" err="1"/>
-              <a:t>synkronisera</a:t>
-            </a:r>
-            <a:r>
-              <a:rPr lang="en-SE" dirty="0"/>
-              <a:t> </a:t>
-            </a:r>
-            <a:r>
-              <a:rPr lang="en-SE" dirty="0" err="1"/>
-              <a:t>tillbaka</a:t>
-            </a:r>
-            <a:r>
-              <a:rPr lang="en-SE" dirty="0"/>
-              <a:t> </a:t>
-            </a:r>
-            <a:r>
-              <a:rPr lang="en-SE" dirty="0" err="1"/>
-              <a:t>allt</a:t>
-            </a:r>
-            <a:r>
-              <a:rPr lang="en-SE" dirty="0"/>
-              <a:t> </a:t>
-            </a:r>
-            <a:r>
-              <a:rPr lang="en-SE" dirty="0" err="1"/>
-              <a:t>igen</a:t>
-            </a:r>
-            <a:r>
-              <a:rPr lang="en-SE" dirty="0"/>
-              <a:t>. </a:t>
-            </a:r>
-            <a:r>
-              <a:rPr lang="en-SE" dirty="0" err="1"/>
-              <a:t>Här</a:t>
-            </a:r>
-            <a:r>
-              <a:rPr lang="en-SE" dirty="0"/>
-              <a:t> </a:t>
-            </a:r>
-            <a:r>
-              <a:rPr lang="en-SE" dirty="0" err="1"/>
-              <a:t>får</a:t>
-            </a:r>
-            <a:r>
-              <a:rPr lang="en-SE" dirty="0"/>
-              <a:t> man fan-in </a:t>
-            </a:r>
-            <a:r>
-              <a:rPr lang="en-SE" dirty="0" err="1"/>
-              <a:t>på</a:t>
-            </a:r>
-            <a:r>
-              <a:rPr lang="en-SE" dirty="0"/>
-              <a:t> </a:t>
-            </a:r>
-            <a:r>
-              <a:rPr lang="en-SE" dirty="0" err="1"/>
-              <a:t>köpet</a:t>
-            </a:r>
-            <a:r>
-              <a:rPr lang="en-SE" dirty="0"/>
-              <a:t> </a:t>
-            </a:r>
-            <a:r>
-              <a:rPr lang="en-SE" dirty="0" err="1"/>
-              <a:t>iom</a:t>
-            </a:r>
-            <a:r>
-              <a:rPr lang="en-SE" dirty="0"/>
-              <a:t> </a:t>
-            </a:r>
-            <a:r>
-              <a:rPr lang="en-SE" dirty="0" err="1"/>
-              <a:t>Task.WhenAll</a:t>
-            </a:r>
-            <a:r>
-              <a:rPr lang="en-SE" dirty="0"/>
-              <a:t>(...).</a:t>
-            </a:r>
+            <a:endParaRPr lang="en-SE" dirty="0"/>
           </a:p>
         </p:txBody>
       </p:sp>
@@ -1435,191 +879,7 @@
           <a:bodyPr/>
           <a:lstStyle/>
           <a:p>
-            <a:r>
-              <a:rPr lang="en-SE" dirty="0"/>
-              <a:t>U</a:t>
-            </a:r>
-            <a:r>
-              <a:rPr lang="sv-SE" dirty="0"/>
-              <a:t>s</a:t>
-            </a:r>
-            <a:r>
-              <a:rPr lang="en-SE" dirty="0"/>
-              <a:t>e case: </a:t>
-            </a:r>
-            <a:r>
-              <a:rPr lang="en-SE" dirty="0" err="1"/>
-              <a:t>Bankid-inloggning</a:t>
-            </a:r>
-            <a:r>
-              <a:rPr lang="en-SE" dirty="0"/>
-              <a:t>/</a:t>
-            </a:r>
-            <a:r>
-              <a:rPr lang="en-SE" dirty="0" err="1"/>
-              <a:t>signering</a:t>
-            </a:r>
-            <a:r>
-              <a:rPr lang="en-SE" dirty="0"/>
-              <a:t> -&gt; </a:t>
-            </a:r>
-            <a:r>
-              <a:rPr lang="en-SE" dirty="0" err="1"/>
-              <a:t>Sätt</a:t>
-            </a:r>
-            <a:r>
-              <a:rPr lang="en-SE" dirty="0"/>
-              <a:t> </a:t>
-            </a:r>
-            <a:r>
-              <a:rPr lang="en-SE" dirty="0" err="1"/>
-              <a:t>igång</a:t>
-            </a:r>
-            <a:r>
-              <a:rPr lang="en-SE" dirty="0"/>
-              <a:t> </a:t>
-            </a:r>
-            <a:r>
-              <a:rPr lang="en-SE" dirty="0" err="1"/>
-              <a:t>en</a:t>
-            </a:r>
-            <a:r>
-              <a:rPr lang="en-SE" dirty="0"/>
-              <a:t> </a:t>
-            </a:r>
-            <a:r>
-              <a:rPr lang="en-SE" dirty="0" err="1"/>
-              <a:t>inloggning</a:t>
-            </a:r>
-            <a:r>
-              <a:rPr lang="en-SE" dirty="0"/>
-              <a:t>, </a:t>
-            </a:r>
-            <a:r>
-              <a:rPr lang="en-SE" dirty="0" err="1"/>
-              <a:t>vänta</a:t>
-            </a:r>
-            <a:r>
-              <a:rPr lang="en-SE" dirty="0"/>
-              <a:t> </a:t>
-            </a:r>
-            <a:r>
-              <a:rPr lang="en-SE" dirty="0" err="1"/>
-              <a:t>på</a:t>
-            </a:r>
-            <a:r>
-              <a:rPr lang="en-SE" dirty="0"/>
-              <a:t> </a:t>
-            </a:r>
-            <a:r>
-              <a:rPr lang="en-SE" dirty="0" err="1"/>
-              <a:t>en</a:t>
-            </a:r>
-            <a:r>
-              <a:rPr lang="en-SE" dirty="0"/>
-              <a:t> </a:t>
-            </a:r>
-            <a:r>
-              <a:rPr lang="en-SE" dirty="0" err="1"/>
-              <a:t>callback</a:t>
-            </a:r>
-            <a:r>
-              <a:rPr lang="en-SE" dirty="0"/>
-              <a:t>, </a:t>
-            </a:r>
-            <a:r>
-              <a:rPr lang="en-SE" dirty="0" err="1"/>
-              <a:t>polla</a:t>
-            </a:r>
-            <a:r>
-              <a:rPr lang="en-SE" dirty="0"/>
-              <a:t> status under </a:t>
-            </a:r>
-            <a:r>
-              <a:rPr lang="en-SE" dirty="0" err="1"/>
-              <a:t>tiden</a:t>
-            </a:r>
-            <a:r>
-              <a:rPr lang="en-SE" dirty="0"/>
-              <a:t> </a:t>
-            </a:r>
-            <a:r>
-              <a:rPr lang="en-SE" dirty="0" err="1"/>
-              <a:t>och</a:t>
-            </a:r>
-            <a:r>
-              <a:rPr lang="en-SE" dirty="0"/>
-              <a:t> </a:t>
-            </a:r>
-            <a:r>
-              <a:rPr lang="en-SE" dirty="0" err="1"/>
-              <a:t>reagera</a:t>
-            </a:r>
-            <a:r>
-              <a:rPr lang="en-SE" dirty="0"/>
-              <a:t> </a:t>
-            </a:r>
-            <a:r>
-              <a:rPr lang="en-SE" dirty="0" err="1"/>
-              <a:t>på</a:t>
-            </a:r>
-            <a:r>
-              <a:rPr lang="en-SE" dirty="0"/>
-              <a:t> </a:t>
-            </a:r>
-            <a:r>
-              <a:rPr lang="en-SE" dirty="0" err="1"/>
-              <a:t>förändring</a:t>
-            </a:r>
-            <a:r>
-              <a:rPr lang="en-SE" dirty="0"/>
-              <a:t> </a:t>
-            </a:r>
-            <a:r>
-              <a:rPr lang="en-SE" dirty="0" err="1"/>
-              <a:t>i</a:t>
-            </a:r>
-            <a:r>
-              <a:rPr lang="en-SE" dirty="0"/>
-              <a:t> status.</a:t>
-            </a:r>
-          </a:p>
-          <a:p>
             <a:endParaRPr lang="en-SE" dirty="0"/>
-          </a:p>
-          <a:p>
-            <a:r>
-              <a:rPr lang="en-SE" dirty="0"/>
-              <a:t>Mix av human-interaction-m</a:t>
-            </a:r>
-            <a:r>
-              <a:rPr lang="sv-SE" dirty="0"/>
-              <a:t>o</a:t>
-            </a:r>
-            <a:r>
-              <a:rPr lang="en-SE" dirty="0" err="1"/>
-              <a:t>nster</a:t>
-            </a:r>
-            <a:r>
-              <a:rPr lang="en-SE" dirty="0"/>
-              <a:t> </a:t>
-            </a:r>
-            <a:r>
-              <a:rPr lang="en-SE" dirty="0" err="1"/>
-              <a:t>och</a:t>
-            </a:r>
-            <a:r>
-              <a:rPr lang="en-SE" dirty="0"/>
-              <a:t> </a:t>
-            </a:r>
-            <a:r>
-              <a:rPr lang="en-SE" dirty="0" err="1"/>
-              <a:t>denna</a:t>
-            </a:r>
-            <a:r>
-              <a:rPr lang="en-SE" dirty="0"/>
-              <a:t>.</a:t>
-            </a:r>
           </a:p>
         </p:txBody>
       </p:sp>
@@ -1703,146 +963,7 @@
           <a:bodyPr/>
           <a:lstStyle/>
           <a:p>
-            <a:r>
-              <a:rPr lang="en-SE" dirty="0"/>
-              <a:t>Use case: </a:t>
-            </a:r>
-            <a:r>
-              <a:rPr lang="en-SE" dirty="0" err="1"/>
-              <a:t>Periodisk</a:t>
-            </a:r>
-            <a:r>
-              <a:rPr lang="en-SE" dirty="0"/>
-              <a:t> </a:t>
-            </a:r>
-            <a:r>
-              <a:rPr lang="sv-SE" dirty="0"/>
-              <a:t>städning</a:t>
-            </a:r>
-            <a:r>
-              <a:rPr lang="en-SE" dirty="0"/>
-              <a:t> </a:t>
-            </a:r>
-            <a:r>
-              <a:rPr lang="en-SE" dirty="0" err="1"/>
-              <a:t>genom</a:t>
-            </a:r>
-            <a:r>
-              <a:rPr lang="en-SE" dirty="0"/>
-              <a:t> </a:t>
-            </a:r>
-            <a:r>
-              <a:rPr lang="en-SE" dirty="0" err="1"/>
-              <a:t>att</a:t>
-            </a:r>
-            <a:r>
-              <a:rPr lang="en-SE" dirty="0"/>
-              <a:t> </a:t>
-            </a:r>
-            <a:r>
-              <a:rPr lang="en-SE" dirty="0" err="1"/>
-              <a:t>kolla</a:t>
-            </a:r>
-            <a:r>
-              <a:rPr lang="en-SE" dirty="0"/>
-              <a:t> status </a:t>
-            </a:r>
-            <a:r>
-              <a:rPr lang="en-SE" dirty="0" err="1"/>
-              <a:t>och</a:t>
-            </a:r>
-            <a:r>
-              <a:rPr lang="en-SE" dirty="0"/>
-              <a:t> </a:t>
-            </a:r>
-            <a:r>
-              <a:rPr lang="en-SE" dirty="0" err="1"/>
-              <a:t>agera</a:t>
-            </a:r>
-            <a:r>
-              <a:rPr lang="en-SE" dirty="0"/>
-              <a:t> </a:t>
-            </a:r>
-            <a:r>
-              <a:rPr lang="en-SE" dirty="0" err="1"/>
-              <a:t>på</a:t>
-            </a:r>
-            <a:r>
-              <a:rPr lang="en-SE" dirty="0"/>
-              <a:t> </a:t>
-            </a:r>
-            <a:r>
-              <a:rPr lang="en-SE" dirty="0" err="1"/>
-              <a:t>förändringar</a:t>
-            </a:r>
-            <a:r>
-              <a:rPr lang="en-SE" dirty="0"/>
-              <a:t> </a:t>
-            </a:r>
-            <a:r>
-              <a:rPr lang="en-SE" dirty="0" err="1"/>
-              <a:t>i</a:t>
-            </a:r>
-            <a:r>
-              <a:rPr lang="en-SE" dirty="0"/>
-              <a:t> status </a:t>
-            </a:r>
-            <a:r>
-              <a:rPr lang="en-SE" dirty="0" err="1"/>
-              <a:t>istället</a:t>
-            </a:r>
-            <a:r>
-              <a:rPr lang="en-SE" dirty="0"/>
-              <a:t> </a:t>
-            </a:r>
-            <a:r>
-              <a:rPr lang="en-SE" dirty="0" err="1"/>
-              <a:t>för</a:t>
-            </a:r>
-            <a:r>
-              <a:rPr lang="en-SE" dirty="0"/>
-              <a:t> </a:t>
-            </a:r>
-            <a:r>
-              <a:rPr lang="en-SE" dirty="0" err="1"/>
-              <a:t>att</a:t>
-            </a:r>
-            <a:r>
-              <a:rPr lang="en-SE" dirty="0"/>
-              <a:t> vid </a:t>
-            </a:r>
-            <a:r>
-              <a:rPr lang="en-SE" dirty="0" err="1"/>
-              <a:t>fasta</a:t>
-            </a:r>
-            <a:r>
-              <a:rPr lang="en-SE" dirty="0"/>
-              <a:t> </a:t>
-            </a:r>
-            <a:r>
-              <a:rPr lang="en-SE" dirty="0" err="1"/>
-              <a:t>tidpunkter</a:t>
-            </a:r>
-            <a:r>
-              <a:rPr lang="en-SE" dirty="0"/>
-              <a:t> </a:t>
-            </a:r>
-            <a:r>
-              <a:rPr lang="en-SE" dirty="0" err="1"/>
-              <a:t>göra</a:t>
-            </a:r>
-            <a:r>
-              <a:rPr lang="en-SE" dirty="0"/>
-              <a:t> </a:t>
-            </a:r>
-            <a:r>
-              <a:rPr lang="en-SE" dirty="0" err="1"/>
-              <a:t>något</a:t>
-            </a:r>
-            <a:r>
-              <a:rPr lang="en-SE" dirty="0"/>
-              <a:t>.</a:t>
-            </a:r>
+            <a:endParaRPr lang="en-SE" dirty="0"/>
           </a:p>
         </p:txBody>
       </p:sp>
@@ -1926,26 +1047,7 @@
           <a:bodyPr/>
           <a:lstStyle/>
           <a:p>
-            <a:r>
-              <a:rPr lang="en-SE" dirty="0"/>
-              <a:t>Use case: </a:t>
-            </a:r>
-            <a:r>
-              <a:rPr lang="en-SE" dirty="0" err="1"/>
-              <a:t>Signering</a:t>
-            </a:r>
-            <a:r>
-              <a:rPr lang="en-SE" dirty="0"/>
-              <a:t> av </a:t>
-            </a:r>
-            <a:r>
-              <a:rPr lang="sv-SE" dirty="0"/>
-              <a:t>dokument</a:t>
-            </a:r>
-            <a:r>
-              <a:rPr lang="en-SE" dirty="0"/>
-              <a:t>, attest av faktura etc.</a:t>
-            </a:r>
+            <a:endParaRPr lang="en-SE" dirty="0"/>
           </a:p>
         </p:txBody>
       </p:sp>
@@ -2029,82 +1131,7 @@
           <a:bodyPr/>
           <a:lstStyle/>
           <a:p>
-            <a:r>
-              <a:rPr lang="en-SE" dirty="0"/>
-              <a:t>Use case: </a:t>
-            </a:r>
-            <a:r>
-              <a:rPr lang="en-SE" dirty="0" err="1"/>
-              <a:t>Aggregering</a:t>
-            </a:r>
-            <a:r>
-              <a:rPr lang="en-SE" dirty="0"/>
-              <a:t> av data </a:t>
-            </a:r>
-            <a:r>
-              <a:rPr lang="en-SE" dirty="0" err="1"/>
-              <a:t>över</a:t>
-            </a:r>
-            <a:r>
-              <a:rPr lang="en-SE" dirty="0"/>
-              <a:t> </a:t>
-            </a:r>
-            <a:r>
-              <a:rPr lang="en-SE" dirty="0" err="1"/>
-              <a:t>tid</a:t>
-            </a:r>
-            <a:r>
-              <a:rPr lang="en-SE" dirty="0"/>
-              <a:t>, </a:t>
-            </a:r>
-            <a:r>
-              <a:rPr lang="en-SE" dirty="0" err="1"/>
-              <a:t>oregelbundet</a:t>
-            </a:r>
-            <a:r>
-              <a:rPr lang="en-SE" dirty="0"/>
-              <a:t> </a:t>
-            </a:r>
-            <a:r>
-              <a:rPr lang="en-SE" dirty="0" err="1"/>
-              <a:t>eller</a:t>
-            </a:r>
-            <a:r>
-              <a:rPr lang="en-SE" dirty="0"/>
-              <a:t> </a:t>
-            </a:r>
-            <a:r>
-              <a:rPr lang="en-SE" dirty="0" err="1"/>
-              <a:t>väldigt</a:t>
-            </a:r>
-            <a:r>
-              <a:rPr lang="en-SE" dirty="0"/>
-              <a:t> </a:t>
-            </a:r>
-            <a:r>
-              <a:rPr lang="en-SE" dirty="0" err="1"/>
-              <a:t>frekevent</a:t>
-            </a:r>
-            <a:r>
-              <a:rPr lang="en-SE" dirty="0"/>
-              <a:t>. </a:t>
-            </a:r>
-            <a:r>
-              <a:rPr lang="en-SE" dirty="0" err="1"/>
-              <a:t>Löser</a:t>
-            </a:r>
-            <a:r>
-              <a:rPr lang="en-SE" dirty="0"/>
-              <a:t> </a:t>
-            </a:r>
-            <a:r>
-              <a:rPr lang="en-SE" dirty="0" err="1"/>
-              <a:t>problemet</a:t>
-            </a:r>
-            <a:r>
-              <a:rPr lang="en-SE" dirty="0"/>
-              <a:t> med concurrency etc.</a:t>
-            </a:r>
+            <a:endParaRPr lang="en-SE" dirty="0"/>
           </a:p>
         </p:txBody>
       </p:sp>
@@ -13692,209 +12719,6 @@
           <a:chExt cx="0" cy="0"/>
         </a:xfrm>
       </p:grpSpPr>
-      <p:sp>
-        <p:nvSpPr>
-          <p:cNvPr id="49" name="Title 3">
-            <a:extLst>
-              <a:ext uri="{FF2B5EF4-FFF2-40B4-BE49-F238E27FC236}">
-                <a16:creationId xmlns:a16="http://schemas.microsoft.com/office/drawing/2014/main" id="{DDA661E4-CCEA-445B-8CF0-7DC57799CE24}"/>
-              </a:ext>
-            </a:extLst>
-          </p:cNvPr>
-          <p:cNvSpPr>
-            <a:spLocks noGrp="1"/>
-          </p:cNvSpPr>
-          <p:nvPr>
-            <p:ph type="title"/>
-          </p:nvPr>
-        </p:nvSpPr>
-        <p:spPr>
-          <a:xfrm>
-            <a:off x="839787" y="754290"/>
-            <a:ext cx="5818399" cy="921657"/>
-          </a:xfrm>
-        </p:spPr>
-        <p:txBody>
-          <a:bodyPr>
-            <a:normAutofit/>
-          </a:bodyPr>
-          <a:lstStyle/>
-          <a:p>
-            <a:r>
-              <a:rPr lang="en-SE" dirty="0" err="1"/>
-              <a:t>Frågor</a:t>
-            </a:r>
-            <a:r>
-              <a:rPr lang="en-SE" dirty="0"/>
-              <a:t>?</a:t>
-            </a:r>
-          </a:p>
-        </p:txBody>
-      </p:sp>
-      <p:sp>
-        <p:nvSpPr>
-          <p:cNvPr id="50" name="Title 3">
-            <a:extLst>
-              <a:ext uri="{FF2B5EF4-FFF2-40B4-BE49-F238E27FC236}">
-                <a16:creationId xmlns:a16="http://schemas.microsoft.com/office/drawing/2014/main" id="{071289C2-4C31-4213-A5D2-D663564662F8}"/>
-              </a:ext>
-            </a:extLst>
-          </p:cNvPr>
-          <p:cNvSpPr txBox="1">
-            <a:spLocks/>
-          </p:cNvSpPr>
-          <p:nvPr/>
-        </p:nvSpPr>
-        <p:spPr>
-          <a:xfrm>
-            <a:off x="839786" y="1675947"/>
-            <a:ext cx="10512427" cy="921657"/>
-          </a:xfrm>
-          <a:prstGeom prst="rect">
-            <a:avLst/>
-          </a:prstGeom>
-        </p:spPr>
-        <p:txBody>
-          <a:bodyPr vert="horz" lIns="91440" tIns="45720" rIns="91440" bIns="45720" rtlCol="0" anchor="ctr">
-            <a:normAutofit/>
-          </a:bodyPr>
-          <a:lstStyle>
-            <a:lvl1pPr algn="l" defTabSz="914400" rtl="0" eaLnBrk="1" latinLnBrk="0" hangingPunct="1">
-              <a:lnSpc>
-                <a:spcPct val="90000"/>
-              </a:lnSpc>
-              <a:spcBef>
-                <a:spcPct val="0"/>
-              </a:spcBef>
-              <a:buNone/>
-              <a:defRPr lang="sv-SE" sz="2800" kern="1200">
-                <a:solidFill>
-                  <a:schemeClr val="accent1"/>
-                </a:solidFill>
-                <a:latin typeface="+mj-lt"/>
-                <a:ea typeface="+mj-ea"/>
-                <a:cs typeface="+mj-cs"/>
-              </a:defRPr>
-            </a:lvl1pPr>
-          </a:lstStyle>
-          <a:p>
-            <a:r>
-              <a:rPr lang="en-SE" dirty="0" err="1"/>
-              <a:t>Här</a:t>
-            </a:r>
-            <a:r>
-              <a:rPr lang="en-SE" dirty="0"/>
-              <a:t> </a:t>
-            </a:r>
-            <a:r>
-              <a:rPr lang="en-SE" dirty="0" err="1"/>
-              <a:t>finns</a:t>
-            </a:r>
-            <a:r>
-              <a:rPr lang="en-SE" dirty="0"/>
-              <a:t> </a:t>
-            </a:r>
-            <a:r>
-              <a:rPr lang="en-SE" dirty="0" err="1"/>
-              <a:t>koden</a:t>
-            </a:r>
-            <a:r>
-              <a:rPr lang="en-SE" dirty="0"/>
-              <a:t> + pptx: </a:t>
-            </a:r>
-          </a:p>
-        </p:txBody>
-      </p:sp>
-      <p:sp>
-        <p:nvSpPr>
-          <p:cNvPr id="51" name="Title 3">
-            <a:extLst>
-              <a:ext uri="{FF2B5EF4-FFF2-40B4-BE49-F238E27FC236}">
-                <a16:creationId xmlns:a16="http://schemas.microsoft.com/office/drawing/2014/main" id="{1347E1D5-0411-4B38-A1C9-B3F761043F92}"/>
-              </a:ext>
-            </a:extLst>
-          </p:cNvPr>
-          <p:cNvSpPr txBox="1">
-            <a:spLocks/>
-          </p:cNvSpPr>
-          <p:nvPr/>
-        </p:nvSpPr>
-        <p:spPr>
-          <a:xfrm>
-            <a:off x="839784" y="2597604"/>
-            <a:ext cx="8170865" cy="921657"/>
-          </a:xfrm>
-          <a:prstGeom prst="rect">
-            <a:avLst/>
-          </a:prstGeom>
-        </p:spPr>
-        <p:txBody>
-          <a:bodyPr vert="horz" lIns="91440" tIns="45720" rIns="91440" bIns="45720" rtlCol="0" anchor="ctr">
-            <a:normAutofit/>
-          </a:bodyPr>
-          <a:lstStyle>
-            <a:lvl1pPr algn="l" defTabSz="914400" rtl="0" eaLnBrk="1" latinLnBrk="0" hangingPunct="1">
-              <a:lnSpc>
-                <a:spcPct val="90000"/>
-              </a:lnSpc>
-              <a:spcBef>
-                <a:spcPct val="0"/>
-              </a:spcBef>
-              <a:buNone/>
-              <a:defRPr lang="sv-SE" sz="2800" kern="1200">
-                <a:solidFill>
-                  <a:schemeClr val="accent1"/>
-                </a:solidFill>
-                <a:latin typeface="+mj-lt"/>
-                <a:ea typeface="+mj-ea"/>
-                <a:cs typeface="+mj-cs"/>
-              </a:defRPr>
-            </a:lvl1pPr>
-          </a:lstStyle>
-          <a:p>
-            <a:r>
-              <a:rPr lang="en-SE" dirty="0" err="1"/>
-              <a:t>Inspelning</a:t>
-            </a:r>
-            <a:r>
-              <a:rPr lang="en-SE" dirty="0"/>
-              <a:t> </a:t>
-            </a:r>
-            <a:r>
-              <a:rPr lang="en-SE" dirty="0" err="1"/>
-              <a:t>finns</a:t>
-            </a:r>
-            <a:r>
-              <a:rPr lang="en-SE" dirty="0"/>
-              <a:t>, </a:t>
-            </a:r>
-            <a:r>
-              <a:rPr lang="en-SE" dirty="0" err="1"/>
-              <a:t>länk</a:t>
-            </a:r>
-            <a:r>
-              <a:rPr lang="en-SE" dirty="0"/>
-              <a:t> </a:t>
-            </a:r>
-            <a:r>
-              <a:rPr lang="en-SE" dirty="0" err="1"/>
-              <a:t>postas</a:t>
-            </a:r>
-            <a:r>
-              <a:rPr lang="en-SE" dirty="0"/>
-              <a:t> </a:t>
-            </a:r>
-            <a:r>
-              <a:rPr lang="en-SE" dirty="0" err="1"/>
-              <a:t>på</a:t>
-            </a:r>
-            <a:r>
-              <a:rPr lang="en-SE" dirty="0"/>
-              <a:t> Teams</a:t>
-            </a:r>
-          </a:p>
-        </p:txBody>
-      </p:sp>
       <p:pic>
         <p:nvPicPr>
           <p:cNvPr id="52" name="Platshållare för bild 5" descr="En bild som visar bord, mat&#10;&#10;Automatiskt genererad beskrivning">
@@ -14172,6 +12996,221 @@
           </a:custGeom>
         </p:spPr>
       </p:pic>
+      <p:sp>
+        <p:nvSpPr>
+          <p:cNvPr id="49" name="Title 3">
+            <a:extLst>
+              <a:ext uri="{FF2B5EF4-FFF2-40B4-BE49-F238E27FC236}">
+                <a16:creationId xmlns:a16="http://schemas.microsoft.com/office/drawing/2014/main" id="{DDA661E4-CCEA-445B-8CF0-7DC57799CE24}"/>
+              </a:ext>
+            </a:extLst>
+          </p:cNvPr>
+          <p:cNvSpPr>
+            <a:spLocks noGrp="1"/>
+          </p:cNvSpPr>
+          <p:nvPr>
+            <p:ph type="title"/>
+          </p:nvPr>
+        </p:nvSpPr>
+        <p:spPr>
+          <a:xfrm>
+            <a:off x="839787" y="754290"/>
+            <a:ext cx="5818399" cy="921657"/>
+          </a:xfrm>
+        </p:spPr>
+        <p:txBody>
+          <a:bodyPr>
+            <a:normAutofit/>
+          </a:bodyPr>
+          <a:lstStyle/>
+          <a:p>
+            <a:r>
+              <a:rPr lang="en-SE" dirty="0" err="1"/>
+              <a:t>Frågor</a:t>
+            </a:r>
+            <a:r>
+              <a:rPr lang="en-SE" dirty="0"/>
+              <a:t>?</a:t>
+            </a:r>
+          </a:p>
+        </p:txBody>
+      </p:sp>
+      <p:sp>
+        <p:nvSpPr>
+          <p:cNvPr id="50" name="Title 3">
+            <a:extLst>
+              <a:ext uri="{FF2B5EF4-FFF2-40B4-BE49-F238E27FC236}">
+                <a16:creationId xmlns:a16="http://schemas.microsoft.com/office/drawing/2014/main" id="{071289C2-4C31-4213-A5D2-D663564662F8}"/>
+              </a:ext>
+            </a:extLst>
+          </p:cNvPr>
+          <p:cNvSpPr txBox="1">
+            <a:spLocks/>
+          </p:cNvSpPr>
+          <p:nvPr/>
+        </p:nvSpPr>
+        <p:spPr>
+          <a:xfrm>
+            <a:off x="839789" y="1804901"/>
+            <a:ext cx="10512427" cy="921657"/>
+          </a:xfrm>
+          <a:prstGeom prst="rect">
+            <a:avLst/>
+          </a:prstGeom>
+        </p:spPr>
+        <p:txBody>
+          <a:bodyPr vert="horz" lIns="91440" tIns="45720" rIns="91440" bIns="45720" rtlCol="0" anchor="ctr">
+            <a:normAutofit fontScale="92500"/>
+          </a:bodyPr>
+          <a:lstStyle>
+            <a:lvl1pPr algn="l" defTabSz="914400" rtl="0" eaLnBrk="1" latinLnBrk="0" hangingPunct="1">
+              <a:lnSpc>
+                <a:spcPct val="90000"/>
+              </a:lnSpc>
+              <a:spcBef>
+                <a:spcPct val="0"/>
+              </a:spcBef>
+              <a:buNone/>
+              <a:defRPr lang="sv-SE" sz="2800" kern="1200">
+                <a:solidFill>
+                  <a:schemeClr val="accent1"/>
+                </a:solidFill>
+                <a:latin typeface="+mj-lt"/>
+                <a:ea typeface="+mj-ea"/>
+                <a:cs typeface="+mj-cs"/>
+              </a:defRPr>
+            </a:lvl1pPr>
+          </a:lstStyle>
+          <a:p>
+            <a:r>
+              <a:rPr lang="en-SE" dirty="0" err="1"/>
+              <a:t>Här</a:t>
+            </a:r>
+            <a:r>
+              <a:rPr lang="en-SE" dirty="0"/>
+              <a:t> </a:t>
+            </a:r>
+            <a:r>
+              <a:rPr lang="en-SE" dirty="0" err="1"/>
+              <a:t>finns</a:t>
+            </a:r>
+            <a:r>
+              <a:rPr lang="en-SE" dirty="0"/>
+              <a:t> </a:t>
+            </a:r>
+            <a:r>
+              <a:rPr lang="en-SE" dirty="0" err="1"/>
+              <a:t>koden</a:t>
+            </a:r>
+            <a:r>
+              <a:rPr lang="en-SE" dirty="0"/>
+              <a:t> + pptx: </a:t>
+            </a:r>
+          </a:p>
+          <a:p>
+            <a:r>
+              <a:rPr lang="sv-SE" sz="2400" dirty="0">
+                <a:hlinkClick r:id="rId3"/>
+              </a:rPr>
+              <a:t>https://github.com/InfozoneGroup/Lunch-Learn-DurableFunctionOrchestrationDemo</a:t>
+            </a:r>
+            <a:r>
+              <a:rPr lang="en-SE" sz="2400" dirty="0"/>
+              <a:t> </a:t>
+            </a:r>
+          </a:p>
+        </p:txBody>
+      </p:sp>
+      <p:sp>
+        <p:nvSpPr>
+          <p:cNvPr id="51" name="Title 3">
+            <a:extLst>
+              <a:ext uri="{FF2B5EF4-FFF2-40B4-BE49-F238E27FC236}">
+                <a16:creationId xmlns:a16="http://schemas.microsoft.com/office/drawing/2014/main" id="{1347E1D5-0411-4B38-A1C9-B3F761043F92}"/>
+              </a:ext>
+            </a:extLst>
+          </p:cNvPr>
+          <p:cNvSpPr txBox="1">
+            <a:spLocks/>
+          </p:cNvSpPr>
+          <p:nvPr/>
+        </p:nvSpPr>
+        <p:spPr>
+          <a:xfrm>
+            <a:off x="839784" y="2597604"/>
+            <a:ext cx="8170865" cy="921657"/>
+          </a:xfrm>
+          <a:prstGeom prst="rect">
+            <a:avLst/>
+          </a:prstGeom>
+        </p:spPr>
+        <p:txBody>
+          <a:bodyPr vert="horz" lIns="91440" tIns="45720" rIns="91440" bIns="45720" rtlCol="0" anchor="ctr">
+            <a:normAutofit/>
+          </a:bodyPr>
+          <a:lstStyle>
+            <a:lvl1pPr algn="l" defTabSz="914400" rtl="0" eaLnBrk="1" latinLnBrk="0" hangingPunct="1">
+              <a:lnSpc>
+                <a:spcPct val="90000"/>
+              </a:lnSpc>
+              <a:spcBef>
+                <a:spcPct val="0"/>
+              </a:spcBef>
+              <a:buNone/>
+              <a:defRPr lang="sv-SE" sz="2800" kern="1200">
+                <a:solidFill>
+                  <a:schemeClr val="accent1"/>
+                </a:solidFill>
+                <a:latin typeface="+mj-lt"/>
+                <a:ea typeface="+mj-ea"/>
+                <a:cs typeface="+mj-cs"/>
+              </a:defRPr>
+            </a:lvl1pPr>
+          </a:lstStyle>
+          <a:p>
+            <a:r>
+              <a:rPr lang="en-SE" dirty="0" err="1"/>
+              <a:t>Inspelning</a:t>
+            </a:r>
+            <a:r>
+              <a:rPr lang="en-SE" dirty="0"/>
+              <a:t> </a:t>
+            </a:r>
+            <a:r>
+              <a:rPr lang="en-SE" dirty="0" err="1"/>
+              <a:t>finns</a:t>
+            </a:r>
+            <a:r>
+              <a:rPr lang="en-SE" dirty="0"/>
+              <a:t>, </a:t>
+            </a:r>
+            <a:r>
+              <a:rPr lang="en-SE" dirty="0" err="1"/>
+              <a:t>länk</a:t>
+            </a:r>
+            <a:r>
+              <a:rPr lang="en-SE" dirty="0"/>
+              <a:t> </a:t>
+            </a:r>
+            <a:r>
+              <a:rPr lang="en-SE" dirty="0" err="1"/>
+              <a:t>postas</a:t>
+            </a:r>
+            <a:r>
+              <a:rPr lang="en-SE" dirty="0"/>
+              <a:t> </a:t>
+            </a:r>
+            <a:r>
+              <a:rPr lang="en-SE" dirty="0" err="1"/>
+              <a:t>på</a:t>
+            </a:r>
+            <a:r>
+              <a:rPr lang="en-SE" dirty="0"/>
+              <a:t> Teams</a:t>
+            </a:r>
+          </a:p>
+        </p:txBody>
+      </p:sp>
     </p:spTree>
     <p:extLst>
       <p:ext uri="{BB962C8B-B14F-4D97-AF65-F5344CB8AC3E}">
@@ -19077,14 +18116,6 @@
 </file>
 
 <file path=customXml/item1.xml><?xml version="1.0" encoding="utf-8"?>
-<p:properties xmlns:p="http://schemas.microsoft.com/office/2006/metadata/properties" xmlns:xsi="http://www.w3.org/2001/XMLSchema-instance" xmlns:pc="http://schemas.microsoft.com/office/infopath/2007/PartnerControls">
-  <documentManagement>
-    <Dokumenttyp xmlns="79989873-1933-4030-a5af-9c9ae85f1deb" xsi:nil="true"/>
-  </documentManagement>
-</p:properties>
-</file>
-
-<file path=customXml/item2.xml><?xml version="1.0" encoding="utf-8"?>
 <ct:contentTypeSchema xmlns:ct="http://schemas.microsoft.com/office/2006/metadata/contentType" xmlns:ma="http://schemas.microsoft.com/office/2006/metadata/properties/metaAttributes" ct:_="" ma:_="" ma:contentTypeName="dokument" ma:contentTypeID="0x010100350D11E526B8AC4F9BA28E57CD1B7A9D" ma:contentTypeVersion="11" ma:contentTypeDescription="Skapa ett nytt dokument." ma:contentTypeScope="" ma:versionID="0230ae9714afd621f6f3a1cff396ffc0">
   <xsd:schema xmlns:xsd="http://www.w3.org/2001/XMLSchema" xmlns:xs="http://www.w3.org/2001/XMLSchema" xmlns:p="http://schemas.microsoft.com/office/2006/metadata/properties" xmlns:ns2="79989873-1933-4030-a5af-9c9ae85f1deb" xmlns:ns3="3b7be02a-60f8-4b25-a7d7-f512eecf9bec" targetNamespace="http://schemas.microsoft.com/office/2006/metadata/properties" ma:root="true" ma:fieldsID="58e2b436a9445bd6233da9647bf7a676" ns2:_="" ns3:_="">
     <xsd:import namespace="79989873-1933-4030-a5af-9c9ae85f1deb"/>
@@ -19295,6 +18326,14 @@
 </ct:contentTypeSchema>
 </file>
 
+<file path=customXml/item2.xml><?xml version="1.0" encoding="utf-8"?>
+<p:properties xmlns:p="http://schemas.microsoft.com/office/2006/metadata/properties" xmlns:xsi="http://www.w3.org/2001/XMLSchema-instance" xmlns:pc="http://schemas.microsoft.com/office/infopath/2007/PartnerControls">
+  <documentManagement>
+    <Dokumenttyp xmlns="79989873-1933-4030-a5af-9c9ae85f1deb" xsi:nil="true"/>
+  </documentManagement>
+</p:properties>
+</file>
+
 <file path=customXml/item3.xml><?xml version="1.0" encoding="utf-8"?>
 <?mso-contentType ?>
 <FormTemplates xmlns="http://schemas.microsoft.com/sharepoint/v3/contenttype/forms">
@@ -19305,16 +18344,6 @@
 </file>
 
 <file path=customXml/itemProps1.xml><?xml version="1.0" encoding="utf-8"?>
-<ds:datastoreItem xmlns:ds="http://schemas.openxmlformats.org/officeDocument/2006/customXml" ds:itemID="{CA595190-91DC-4C55-8CBC-4A7F4E0D64AA}">
-  <ds:schemaRefs>
-    <ds:schemaRef ds:uri="http://schemas.microsoft.com/office/2006/metadata/properties"/>
-    <ds:schemaRef ds:uri="http://schemas.microsoft.com/office/infopath/2007/PartnerControls"/>
-    <ds:schemaRef ds:uri="79989873-1933-4030-a5af-9c9ae85f1deb"/>
-  </ds:schemaRefs>
-</ds:datastoreItem>
-</file>
-
-<file path=customXml/itemProps2.xml><?xml version="1.0" encoding="utf-8"?>
 <ds:datastoreItem xmlns:ds="http://schemas.openxmlformats.org/officeDocument/2006/customXml" ds:itemID="{2269FB51-990C-4090-83AF-796D8B78C721}">
   <ds:schemaRefs>
     <ds:schemaRef ds:uri="http://schemas.microsoft.com/office/2006/metadata/contentType"/>
@@ -19333,6 +18362,16 @@
 </ds:datastoreItem>
 </file>
 
+<file path=customXml/itemProps2.xml><?xml version="1.0" encoding="utf-8"?>
+<ds:datastoreItem xmlns:ds="http://schemas.openxmlformats.org/officeDocument/2006/customXml" ds:itemID="{CA595190-91DC-4C55-8CBC-4A7F4E0D64AA}">
+  <ds:schemaRefs>
+    <ds:schemaRef ds:uri="http://schemas.microsoft.com/office/2006/metadata/properties"/>
+    <ds:schemaRef ds:uri="http://schemas.microsoft.com/office/infopath/2007/PartnerControls"/>
+    <ds:schemaRef ds:uri="79989873-1933-4030-a5af-9c9ae85f1deb"/>
+  </ds:schemaRefs>
+</ds:datastoreItem>
+</file>
+
 <file path=customXml/itemProps3.xml><?xml version="1.0" encoding="utf-8"?>
 <ds:datastoreItem xmlns:ds="http://schemas.openxmlformats.org/officeDocument/2006/customXml" ds:itemID="{7E1975E0-3006-4B25-93FF-9F474E8CC29B}">
   <ds:schemaRefs>

</xml_diff>